<commit_message>
Added more information to the presentation.
</commit_message>
<xml_diff>
--- a/203_Presentation.pptx
+++ b/203_Presentation.pptx
@@ -2,14 +2,16 @@
 <file path=ppt/presentation.xml><?xml version="1.0" encoding="utf-8"?>
 <p:presentation xmlns:a="http://schemas.openxmlformats.org/drawingml/2006/main" xmlns:r="http://schemas.openxmlformats.org/officeDocument/2006/relationships" xmlns:p="http://schemas.openxmlformats.org/presentationml/2006/main" saveSubsetFonts="1">
   <p:sldMasterIdLst>
-    <p:sldMasterId id="2147483748" r:id="rId1"/>
+    <p:sldMasterId id="2147483779" r:id="rId1"/>
   </p:sldMasterIdLst>
   <p:sldIdLst>
     <p:sldId id="256" r:id="rId2"/>
     <p:sldId id="257" r:id="rId3"/>
     <p:sldId id="258" r:id="rId4"/>
-    <p:sldId id="259" r:id="rId5"/>
-    <p:sldId id="260" r:id="rId6"/>
+    <p:sldId id="262" r:id="rId5"/>
+    <p:sldId id="259" r:id="rId6"/>
+    <p:sldId id="261" r:id="rId7"/>
+    <p:sldId id="260" r:id="rId8"/>
   </p:sldIdLst>
   <p:sldSz cx="12192000" cy="6858000"/>
   <p:notesSz cx="6858000" cy="9144000"/>
@@ -17,7 +19,7 @@
     <a:defPPr>
       <a:defRPr lang="en-US"/>
     </a:defPPr>
-    <a:lvl1pPr marL="0" algn="l" defTabSz="914400" rtl="0" eaLnBrk="1" latinLnBrk="0" hangingPunct="1">
+    <a:lvl1pPr marL="0" algn="l" defTabSz="457200" rtl="0" eaLnBrk="1" latinLnBrk="0" hangingPunct="1">
       <a:defRPr sz="1800" kern="1200">
         <a:solidFill>
           <a:schemeClr val="tx1"/>
@@ -27,7 +29,7 @@
         <a:cs typeface="+mn-cs"/>
       </a:defRPr>
     </a:lvl1pPr>
-    <a:lvl2pPr marL="457200" algn="l" defTabSz="914400" rtl="0" eaLnBrk="1" latinLnBrk="0" hangingPunct="1">
+    <a:lvl2pPr marL="457200" algn="l" defTabSz="457200" rtl="0" eaLnBrk="1" latinLnBrk="0" hangingPunct="1">
       <a:defRPr sz="1800" kern="1200">
         <a:solidFill>
           <a:schemeClr val="tx1"/>
@@ -37,7 +39,7 @@
         <a:cs typeface="+mn-cs"/>
       </a:defRPr>
     </a:lvl2pPr>
-    <a:lvl3pPr marL="914400" algn="l" defTabSz="914400" rtl="0" eaLnBrk="1" latinLnBrk="0" hangingPunct="1">
+    <a:lvl3pPr marL="914400" algn="l" defTabSz="457200" rtl="0" eaLnBrk="1" latinLnBrk="0" hangingPunct="1">
       <a:defRPr sz="1800" kern="1200">
         <a:solidFill>
           <a:schemeClr val="tx1"/>
@@ -47,7 +49,7 @@
         <a:cs typeface="+mn-cs"/>
       </a:defRPr>
     </a:lvl3pPr>
-    <a:lvl4pPr marL="1371600" algn="l" defTabSz="914400" rtl="0" eaLnBrk="1" latinLnBrk="0" hangingPunct="1">
+    <a:lvl4pPr marL="1371600" algn="l" defTabSz="457200" rtl="0" eaLnBrk="1" latinLnBrk="0" hangingPunct="1">
       <a:defRPr sz="1800" kern="1200">
         <a:solidFill>
           <a:schemeClr val="tx1"/>
@@ -57,7 +59,7 @@
         <a:cs typeface="+mn-cs"/>
       </a:defRPr>
     </a:lvl4pPr>
-    <a:lvl5pPr marL="1828800" algn="l" defTabSz="914400" rtl="0" eaLnBrk="1" latinLnBrk="0" hangingPunct="1">
+    <a:lvl5pPr marL="1828800" algn="l" defTabSz="457200" rtl="0" eaLnBrk="1" latinLnBrk="0" hangingPunct="1">
       <a:defRPr sz="1800" kern="1200">
         <a:solidFill>
           <a:schemeClr val="tx1"/>
@@ -67,7 +69,7 @@
         <a:cs typeface="+mn-cs"/>
       </a:defRPr>
     </a:lvl5pPr>
-    <a:lvl6pPr marL="2286000" algn="l" defTabSz="914400" rtl="0" eaLnBrk="1" latinLnBrk="0" hangingPunct="1">
+    <a:lvl6pPr marL="2286000" algn="l" defTabSz="457200" rtl="0" eaLnBrk="1" latinLnBrk="0" hangingPunct="1">
       <a:defRPr sz="1800" kern="1200">
         <a:solidFill>
           <a:schemeClr val="tx1"/>
@@ -77,7 +79,7 @@
         <a:cs typeface="+mn-cs"/>
       </a:defRPr>
     </a:lvl6pPr>
-    <a:lvl7pPr marL="2743200" algn="l" defTabSz="914400" rtl="0" eaLnBrk="1" latinLnBrk="0" hangingPunct="1">
+    <a:lvl7pPr marL="2743200" algn="l" defTabSz="457200" rtl="0" eaLnBrk="1" latinLnBrk="0" hangingPunct="1">
       <a:defRPr sz="1800" kern="1200">
         <a:solidFill>
           <a:schemeClr val="tx1"/>
@@ -87,7 +89,7 @@
         <a:cs typeface="+mn-cs"/>
       </a:defRPr>
     </a:lvl7pPr>
-    <a:lvl8pPr marL="3200400" algn="l" defTabSz="914400" rtl="0" eaLnBrk="1" latinLnBrk="0" hangingPunct="1">
+    <a:lvl8pPr marL="3200400" algn="l" defTabSz="457200" rtl="0" eaLnBrk="1" latinLnBrk="0" hangingPunct="1">
       <a:defRPr sz="1800" kern="1200">
         <a:solidFill>
           <a:schemeClr val="tx1"/>
@@ -97,7 +99,7 @@
         <a:cs typeface="+mn-cs"/>
       </a:defRPr>
     </a:lvl8pPr>
-    <a:lvl9pPr marL="3657600" algn="l" defTabSz="914400" rtl="0" eaLnBrk="1" latinLnBrk="0" hangingPunct="1">
+    <a:lvl9pPr marL="3657600" algn="l" defTabSz="457200" rtl="0" eaLnBrk="1" latinLnBrk="0" hangingPunct="1">
       <a:defRPr sz="1800" kern="1200">
         <a:solidFill>
           <a:schemeClr val="tx1"/>
@@ -108,11 +110,16 @@
       </a:defRPr>
     </a:lvl9pPr>
   </p:defaultTextStyle>
+  <p:extLst>
+    <p:ext uri="{EFAFB233-063F-42B5-8137-9DF3F51BA10A}">
+      <p15:sldGuideLst xmlns:p15="http://schemas.microsoft.com/office/powerpoint/2012/main"/>
+    </p:ext>
+  </p:extLst>
 </p:presentation>
 </file>
 
 <file path=ppt/slideLayouts/slideLayout1.xml><?xml version="1.0" encoding="utf-8"?>
-<p:sldLayout xmlns:a="http://schemas.openxmlformats.org/drawingml/2006/main" xmlns:r="http://schemas.openxmlformats.org/officeDocument/2006/relationships" xmlns:p="http://schemas.openxmlformats.org/presentationml/2006/main" type="title" preserve="1">
+<p:sldLayout xmlns:a="http://schemas.openxmlformats.org/drawingml/2006/main" xmlns:r="http://schemas.openxmlformats.org/officeDocument/2006/relationships" xmlns:p="http://schemas.openxmlformats.org/presentationml/2006/main" showMasterSp="0" type="title" preserve="1">
   <p:cSld name="Title Slide">
     <p:spTree>
       <p:nvGrpSpPr>
@@ -130,24 +137,96 @@
       </p:grpSpPr>
       <p:sp>
         <p:nvSpPr>
-          <p:cNvPr id="2" name="Title 1">
-            <a:extLst>
-              <a:ext uri="{FF2B5EF4-FFF2-40B4-BE49-F238E27FC236}">
-                <a16:creationId xmlns:a16="http://schemas.microsoft.com/office/drawing/2014/main" id="{8DA57C3F-0FB2-4B2E-BA6A-FEEEFF1AF7E3}"/>
-              </a:ext>
-            </a:extLst>
-          </p:cNvPr>
-          <p:cNvSpPr>
-            <a:spLocks noGrp="1"/>
-          </p:cNvSpPr>
-          <p:nvPr>
-            <p:ph type="ctrTitle"/>
-          </p:nvPr>
+          <p:cNvPr id="7" name="Rectangle 6"/>
+          <p:cNvSpPr/>
+          <p:nvPr/>
         </p:nvSpPr>
         <p:spPr>
           <a:xfrm>
-            <a:off x="2057400" y="685801"/>
-            <a:ext cx="8115300" cy="3046228"/>
+            <a:off x="0" y="761999"/>
+            <a:ext cx="9141619" cy="5334001"/>
+          </a:xfrm>
+          <a:prstGeom prst="rect">
+            <a:avLst/>
+          </a:prstGeom>
+          <a:solidFill>
+            <a:schemeClr val="accent1"/>
+          </a:solidFill>
+          <a:ln>
+            <a:noFill/>
+          </a:ln>
+        </p:spPr>
+        <p:style>
+          <a:lnRef idx="2">
+            <a:schemeClr val="accent1">
+              <a:shade val="50000"/>
+            </a:schemeClr>
+          </a:lnRef>
+          <a:fillRef idx="1">
+            <a:schemeClr val="accent1"/>
+          </a:fillRef>
+          <a:effectRef idx="0">
+            <a:schemeClr val="accent1"/>
+          </a:effectRef>
+          <a:fontRef idx="minor">
+            <a:schemeClr val="lt1"/>
+          </a:fontRef>
+        </p:style>
+      </p:sp>
+      <p:sp>
+        <p:nvSpPr>
+          <p:cNvPr id="8" name="Rectangle 7"/>
+          <p:cNvSpPr/>
+          <p:nvPr/>
+        </p:nvSpPr>
+        <p:spPr>
+          <a:xfrm>
+            <a:off x="9270263" y="761999"/>
+            <a:ext cx="2925318" cy="5334001"/>
+          </a:xfrm>
+          <a:prstGeom prst="rect">
+            <a:avLst/>
+          </a:prstGeom>
+          <a:solidFill>
+            <a:srgbClr val="C8C8C8">
+              <a:alpha val="49804"/>
+            </a:srgbClr>
+          </a:solidFill>
+          <a:ln>
+            <a:noFill/>
+          </a:ln>
+        </p:spPr>
+        <p:style>
+          <a:lnRef idx="2">
+            <a:schemeClr val="accent1">
+              <a:shade val="50000"/>
+            </a:schemeClr>
+          </a:lnRef>
+          <a:fillRef idx="1">
+            <a:schemeClr val="accent1"/>
+          </a:fillRef>
+          <a:effectRef idx="0">
+            <a:schemeClr val="accent1"/>
+          </a:effectRef>
+          <a:fontRef idx="minor">
+            <a:schemeClr val="lt1"/>
+          </a:fontRef>
+        </p:style>
+      </p:sp>
+      <p:sp>
+        <p:nvSpPr>
+          <p:cNvPr id="2" name="Title 1"/>
+          <p:cNvSpPr>
+            <a:spLocks noGrp="1"/>
+          </p:cNvSpPr>
+          <p:nvPr>
+            <p:ph type="ctrTitle"/>
+          </p:nvPr>
+        </p:nvSpPr>
+        <p:spPr>
+          <a:xfrm>
+            <a:off x="1069848" y="1298448"/>
+            <a:ext cx="7315200" cy="3255264"/>
           </a:xfrm>
         </p:spPr>
         <p:txBody>
@@ -155,8 +234,12 @@
             <a:normAutofit/>
           </a:bodyPr>
           <a:lstStyle>
-            <a:lvl1pPr algn="ctr">
-              <a:defRPr sz="3600" cap="all" spc="300" baseline="0"/>
+            <a:lvl1pPr algn="l">
+              <a:defRPr sz="5900" spc="-100" baseline="0">
+                <a:solidFill>
+                  <a:srgbClr val="FFFFFF"/>
+                </a:solidFill>
+              </a:defRPr>
             </a:lvl1pPr>
           </a:lstStyle>
           <a:p>
@@ -170,13 +253,7 @@
       </p:sp>
       <p:sp>
         <p:nvSpPr>
-          <p:cNvPr id="3" name="Subtitle 2">
-            <a:extLst>
-              <a:ext uri="{FF2B5EF4-FFF2-40B4-BE49-F238E27FC236}">
-                <a16:creationId xmlns:a16="http://schemas.microsoft.com/office/drawing/2014/main" id="{08583AE9-1CC1-4572-A6E5-E97F80E47661}"/>
-              </a:ext>
-            </a:extLst>
-          </p:cNvPr>
+          <p:cNvPr id="3" name="Subtitle 2"/>
           <p:cNvSpPr>
             <a:spLocks noGrp="1"/>
           </p:cNvSpPr>
@@ -186,48 +263,57 @@
         </p:nvSpPr>
         <p:spPr>
           <a:xfrm>
-            <a:off x="2057400" y="4114800"/>
-            <a:ext cx="8115300" cy="2057400"/>
+            <a:off x="1100015" y="4670246"/>
+            <a:ext cx="7315200" cy="914400"/>
           </a:xfrm>
         </p:spPr>
         <p:txBody>
-          <a:bodyPr/>
+          <a:bodyPr anchor="t">
+            <a:normAutofit/>
+          </a:bodyPr>
           <a:lstStyle>
-            <a:lvl1pPr marL="0" indent="0" algn="ctr">
-              <a:buNone/>
-              <a:defRPr sz="2400" i="1"/>
+            <a:lvl1pPr marL="0" indent="0" algn="l">
+              <a:buNone/>
+              <a:defRPr sz="2200" cap="none" spc="0" baseline="0">
+                <a:solidFill>
+                  <a:schemeClr val="accent1">
+                    <a:lumMod val="20000"/>
+                    <a:lumOff val="80000"/>
+                  </a:schemeClr>
+                </a:solidFill>
+              </a:defRPr>
             </a:lvl1pPr>
             <a:lvl2pPr marL="457200" indent="0" algn="ctr">
               <a:buNone/>
-              <a:defRPr sz="2000"/>
+              <a:defRPr sz="2200"/>
             </a:lvl2pPr>
             <a:lvl3pPr marL="914400" indent="0" algn="ctr">
               <a:buNone/>
-              <a:defRPr sz="1800"/>
+              <a:defRPr sz="2200"/>
             </a:lvl3pPr>
             <a:lvl4pPr marL="1371600" indent="0" algn="ctr">
               <a:buNone/>
-              <a:defRPr sz="1600"/>
+              <a:defRPr sz="2000"/>
             </a:lvl4pPr>
             <a:lvl5pPr marL="1828800" indent="0" algn="ctr">
               <a:buNone/>
-              <a:defRPr sz="1600"/>
+              <a:defRPr sz="2000"/>
             </a:lvl5pPr>
             <a:lvl6pPr marL="2286000" indent="0" algn="ctr">
               <a:buNone/>
-              <a:defRPr sz="1600"/>
+              <a:defRPr sz="2000"/>
             </a:lvl6pPr>
             <a:lvl7pPr marL="2743200" indent="0" algn="ctr">
               <a:buNone/>
-              <a:defRPr sz="1600"/>
+              <a:defRPr sz="2000"/>
             </a:lvl7pPr>
             <a:lvl8pPr marL="3200400" indent="0" algn="ctr">
               <a:buNone/>
-              <a:defRPr sz="1600"/>
+              <a:defRPr sz="2000"/>
             </a:lvl8pPr>
             <a:lvl9pPr marL="3657600" indent="0" algn="ctr">
               <a:buNone/>
-              <a:defRPr sz="1600"/>
+              <a:defRPr sz="2000"/>
             </a:lvl9pPr>
           </a:lstStyle>
           <a:p>
@@ -241,13 +327,7 @@
       </p:sp>
       <p:sp>
         <p:nvSpPr>
-          <p:cNvPr id="4" name="Date Placeholder 3">
-            <a:extLst>
-              <a:ext uri="{FF2B5EF4-FFF2-40B4-BE49-F238E27FC236}">
-                <a16:creationId xmlns:a16="http://schemas.microsoft.com/office/drawing/2014/main" id="{9C04DE7C-68AB-403D-B9D8-7398C292C6DA}"/>
-              </a:ext>
-            </a:extLst>
-          </p:cNvPr>
+          <p:cNvPr id="4" name="Date Placeholder 3"/>
           <p:cNvSpPr>
             <a:spLocks noGrp="1"/>
           </p:cNvSpPr>
@@ -262,7 +342,7 @@
           <a:p>
             <a:fld id="{23FEA57E-7C1A-457B-A4CD-5DCEB057B502}" type="datetime1">
               <a:rPr lang="en-US" smtClean="0"/>
-              <a:t>11/30/2022</a:t>
+              <a:t>12/6/2022</a:t>
             </a:fld>
             <a:endParaRPr lang="en-US" dirty="0"/>
           </a:p>
@@ -270,13 +350,7 @@
       </p:sp>
       <p:sp>
         <p:nvSpPr>
-          <p:cNvPr id="5" name="Footer Placeholder 4">
-            <a:extLst>
-              <a:ext uri="{FF2B5EF4-FFF2-40B4-BE49-F238E27FC236}">
-                <a16:creationId xmlns:a16="http://schemas.microsoft.com/office/drawing/2014/main" id="{51003E50-6613-4D86-AA22-43B14E7279E9}"/>
-              </a:ext>
-            </a:extLst>
-          </p:cNvPr>
+          <p:cNvPr id="5" name="Footer Placeholder 4"/>
           <p:cNvSpPr>
             <a:spLocks noGrp="1"/>
           </p:cNvSpPr>
@@ -290,21 +364,16 @@
           <a:lstStyle/>
           <a:p>
             <a:r>
-              <a:rPr lang="en-US" dirty="0"/>
+              <a:rPr lang="en-US"/>
               <a:t>Sample Footer Text</a:t>
             </a:r>
-          </a:p>
-        </p:txBody>
-      </p:sp>
-      <p:sp>
-        <p:nvSpPr>
-          <p:cNvPr id="6" name="Slide Number Placeholder 5">
-            <a:extLst>
-              <a:ext uri="{FF2B5EF4-FFF2-40B4-BE49-F238E27FC236}">
-                <a16:creationId xmlns:a16="http://schemas.microsoft.com/office/drawing/2014/main" id="{03069AB5-A56D-471F-9236-EFA981E2EA03}"/>
-              </a:ext>
-            </a:extLst>
-          </p:cNvPr>
+            <a:endParaRPr lang="en-US" dirty="0"/>
+          </a:p>
+        </p:txBody>
+      </p:sp>
+      <p:sp>
+        <p:nvSpPr>
+          <p:cNvPr id="6" name="Slide Number Placeholder 5"/>
           <p:cNvSpPr>
             <a:spLocks noGrp="1"/>
           </p:cNvSpPr>
@@ -328,7 +397,7 @@
     </p:spTree>
     <p:extLst>
       <p:ext uri="{BB962C8B-B14F-4D97-AF65-F5344CB8AC3E}">
-        <p14:creationId xmlns:p14="http://schemas.microsoft.com/office/powerpoint/2010/main" val="3832407726"/>
+        <p14:creationId xmlns:p14="http://schemas.microsoft.com/office/powerpoint/2010/main" val="1149459409"/>
       </p:ext>
     </p:extLst>
   </p:cSld>
@@ -357,13 +426,7 @@
       </p:grpSpPr>
       <p:sp>
         <p:nvSpPr>
-          <p:cNvPr id="2" name="Title 1">
-            <a:extLst>
-              <a:ext uri="{FF2B5EF4-FFF2-40B4-BE49-F238E27FC236}">
-                <a16:creationId xmlns:a16="http://schemas.microsoft.com/office/drawing/2014/main" id="{A402744C-12E6-455B-B646-2EA92DE0E9A2}"/>
-              </a:ext>
-            </a:extLst>
-          </p:cNvPr>
+          <p:cNvPr id="2" name="Title 1"/>
           <p:cNvSpPr>
             <a:spLocks noGrp="1"/>
           </p:cNvSpPr>
@@ -386,13 +449,7 @@
       </p:sp>
       <p:sp>
         <p:nvSpPr>
-          <p:cNvPr id="3" name="Vertical Text Placeholder 2">
-            <a:extLst>
-              <a:ext uri="{FF2B5EF4-FFF2-40B4-BE49-F238E27FC236}">
-                <a16:creationId xmlns:a16="http://schemas.microsoft.com/office/drawing/2014/main" id="{B7D71C4D-C062-4EEE-9A9A-31ADCC5C8767}"/>
-              </a:ext>
-            </a:extLst>
-          </p:cNvPr>
+          <p:cNvPr id="3" name="Vertical Text Placeholder 2"/>
           <p:cNvSpPr>
             <a:spLocks noGrp="1"/>
           </p:cNvSpPr>
@@ -402,7 +459,7 @@
         </p:nvSpPr>
         <p:spPr/>
         <p:txBody>
-          <a:bodyPr vert="eaVert"/>
+          <a:bodyPr vert="eaVert" anchor="t"/>
           <a:lstStyle/>
           <a:p>
             <a:pPr lvl="0"/>
@@ -444,13 +501,7 @@
       </p:sp>
       <p:sp>
         <p:nvSpPr>
-          <p:cNvPr id="4" name="Date Placeholder 3">
-            <a:extLst>
-              <a:ext uri="{FF2B5EF4-FFF2-40B4-BE49-F238E27FC236}">
-                <a16:creationId xmlns:a16="http://schemas.microsoft.com/office/drawing/2014/main" id="{1944DC97-C26E-407A-9E29-68C52D547BDA}"/>
-              </a:ext>
-            </a:extLst>
-          </p:cNvPr>
+          <p:cNvPr id="7" name="Date Placeholder 6"/>
           <p:cNvSpPr>
             <a:spLocks noGrp="1"/>
           </p:cNvSpPr>
@@ -465,7 +516,7 @@
           <a:p>
             <a:fld id="{11789749-A4CD-447F-8298-2B7988C91CEA}" type="datetime1">
               <a:rPr lang="en-US" smtClean="0"/>
-              <a:t>11/30/2022</a:t>
+              <a:t>12/6/2022</a:t>
             </a:fld>
             <a:endParaRPr lang="en-US"/>
           </a:p>
@@ -473,13 +524,7 @@
       </p:sp>
       <p:sp>
         <p:nvSpPr>
-          <p:cNvPr id="5" name="Footer Placeholder 4">
-            <a:extLst>
-              <a:ext uri="{FF2B5EF4-FFF2-40B4-BE49-F238E27FC236}">
-                <a16:creationId xmlns:a16="http://schemas.microsoft.com/office/drawing/2014/main" id="{E72E9353-B771-47FF-975E-72337414E0ED}"/>
-              </a:ext>
-            </a:extLst>
-          </p:cNvPr>
+          <p:cNvPr id="8" name="Footer Placeholder 7"/>
           <p:cNvSpPr>
             <a:spLocks noGrp="1"/>
           </p:cNvSpPr>
@@ -493,21 +538,16 @@
           <a:lstStyle/>
           <a:p>
             <a:r>
-              <a:rPr lang="en-US" dirty="0"/>
+              <a:rPr lang="en-US"/>
               <a:t>Sample Footer Text</a:t>
             </a:r>
-          </a:p>
-        </p:txBody>
-      </p:sp>
-      <p:sp>
-        <p:nvSpPr>
-          <p:cNvPr id="6" name="Slide Number Placeholder 5">
-            <a:extLst>
-              <a:ext uri="{FF2B5EF4-FFF2-40B4-BE49-F238E27FC236}">
-                <a16:creationId xmlns:a16="http://schemas.microsoft.com/office/drawing/2014/main" id="{1EA5A858-B8B2-4364-A7D0-B2E8FAE0ADD4}"/>
-              </a:ext>
-            </a:extLst>
-          </p:cNvPr>
+            <a:endParaRPr lang="en-US" dirty="0"/>
+          </a:p>
+        </p:txBody>
+      </p:sp>
+      <p:sp>
+        <p:nvSpPr>
+          <p:cNvPr id="9" name="Slide Number Placeholder 8"/>
           <p:cNvSpPr>
             <a:spLocks noGrp="1"/>
           </p:cNvSpPr>
@@ -531,7 +571,7 @@
     </p:spTree>
     <p:extLst>
       <p:ext uri="{BB962C8B-B14F-4D97-AF65-F5344CB8AC3E}">
-        <p14:creationId xmlns:p14="http://schemas.microsoft.com/office/powerpoint/2010/main" val="624000530"/>
+        <p14:creationId xmlns:p14="http://schemas.microsoft.com/office/powerpoint/2010/main" val="1598652409"/>
       </p:ext>
     </p:extLst>
   </p:cSld>
@@ -560,13 +600,7 @@
       </p:grpSpPr>
       <p:sp>
         <p:nvSpPr>
-          <p:cNvPr id="2" name="Vertical Title 1">
-            <a:extLst>
-              <a:ext uri="{FF2B5EF4-FFF2-40B4-BE49-F238E27FC236}">
-                <a16:creationId xmlns:a16="http://schemas.microsoft.com/office/drawing/2014/main" id="{42A6BABE-D80C-4F54-A03C-E1F9EBCA8323}"/>
-              </a:ext>
-            </a:extLst>
-          </p:cNvPr>
+          <p:cNvPr id="2" name="Vertical Title 1"/>
           <p:cNvSpPr>
             <a:spLocks noGrp="1"/>
           </p:cNvSpPr>
@@ -576,8 +610,8 @@
         </p:nvSpPr>
         <p:spPr>
           <a:xfrm>
-            <a:off x="8724900" y="365125"/>
-            <a:ext cx="2628900" cy="5811838"/>
+            <a:off x="381000" y="990600"/>
+            <a:ext cx="2819400" cy="4953000"/>
           </a:xfrm>
         </p:spPr>
         <p:txBody>
@@ -588,18 +622,13 @@
               <a:rPr lang="en-US"/>
               <a:t>Click to edit Master title style</a:t>
             </a:r>
-          </a:p>
-        </p:txBody>
-      </p:sp>
-      <p:sp>
-        <p:nvSpPr>
-          <p:cNvPr id="3" name="Vertical Text Placeholder 2">
-            <a:extLst>
-              <a:ext uri="{FF2B5EF4-FFF2-40B4-BE49-F238E27FC236}">
-                <a16:creationId xmlns:a16="http://schemas.microsoft.com/office/drawing/2014/main" id="{69285191-EF5B-48BE-AB5D-B7BA4C3D093D}"/>
-              </a:ext>
-            </a:extLst>
-          </p:cNvPr>
+            <a:endParaRPr lang="en-US" dirty="0"/>
+          </a:p>
+        </p:txBody>
+      </p:sp>
+      <p:sp>
+        <p:nvSpPr>
+          <p:cNvPr id="3" name="Vertical Text Placeholder 2"/>
           <p:cNvSpPr>
             <a:spLocks noGrp="1"/>
           </p:cNvSpPr>
@@ -609,12 +638,12 @@
         </p:nvSpPr>
         <p:spPr>
           <a:xfrm>
-            <a:off x="838200" y="365125"/>
-            <a:ext cx="7734300" cy="5811838"/>
+            <a:off x="3867912" y="868680"/>
+            <a:ext cx="7315200" cy="5120640"/>
           </a:xfrm>
         </p:spPr>
         <p:txBody>
-          <a:bodyPr vert="eaVert"/>
+          <a:bodyPr vert="eaVert" anchor="t"/>
           <a:lstStyle/>
           <a:p>
             <a:pPr lvl="0"/>
@@ -650,18 +679,13 @@
               <a:rPr lang="en-US"/>
               <a:t>Fifth level</a:t>
             </a:r>
-          </a:p>
-        </p:txBody>
-      </p:sp>
-      <p:sp>
-        <p:nvSpPr>
-          <p:cNvPr id="4" name="Date Placeholder 3">
-            <a:extLst>
-              <a:ext uri="{FF2B5EF4-FFF2-40B4-BE49-F238E27FC236}">
-                <a16:creationId xmlns:a16="http://schemas.microsoft.com/office/drawing/2014/main" id="{19FA387A-1231-4FE3-8574-D4331A3432D2}"/>
-              </a:ext>
-            </a:extLst>
-          </p:cNvPr>
+            <a:endParaRPr lang="en-US" dirty="0"/>
+          </a:p>
+        </p:txBody>
+      </p:sp>
+      <p:sp>
+        <p:nvSpPr>
+          <p:cNvPr id="7" name="Date Placeholder 6"/>
           <p:cNvSpPr>
             <a:spLocks noGrp="1"/>
           </p:cNvSpPr>
@@ -676,7 +700,7 @@
           <a:p>
             <a:fld id="{BA0444D3-C0BA-4587-A56C-581AB9F841BE}" type="datetime1">
               <a:rPr lang="en-US" smtClean="0"/>
-              <a:t>11/30/2022</a:t>
+              <a:t>12/6/2022</a:t>
             </a:fld>
             <a:endParaRPr lang="en-US"/>
           </a:p>
@@ -684,13 +708,7 @@
       </p:sp>
       <p:sp>
         <p:nvSpPr>
-          <p:cNvPr id="5" name="Footer Placeholder 4">
-            <a:extLst>
-              <a:ext uri="{FF2B5EF4-FFF2-40B4-BE49-F238E27FC236}">
-                <a16:creationId xmlns:a16="http://schemas.microsoft.com/office/drawing/2014/main" id="{02F21559-4901-4AD3-ABE7-DF0235457312}"/>
-              </a:ext>
-            </a:extLst>
-          </p:cNvPr>
+          <p:cNvPr id="8" name="Footer Placeholder 7"/>
           <p:cNvSpPr>
             <a:spLocks noGrp="1"/>
           </p:cNvSpPr>
@@ -712,13 +730,7 @@
       </p:sp>
       <p:sp>
         <p:nvSpPr>
-          <p:cNvPr id="6" name="Slide Number Placeholder 5">
-            <a:extLst>
-              <a:ext uri="{FF2B5EF4-FFF2-40B4-BE49-F238E27FC236}">
-                <a16:creationId xmlns:a16="http://schemas.microsoft.com/office/drawing/2014/main" id="{D8F6C18E-B751-4E7B-9CD8-1BF44DAB80F4}"/>
-              </a:ext>
-            </a:extLst>
-          </p:cNvPr>
+          <p:cNvPr id="9" name="Slide Number Placeholder 8"/>
           <p:cNvSpPr>
             <a:spLocks noGrp="1"/>
           </p:cNvSpPr>
@@ -742,7 +754,7 @@
     </p:spTree>
     <p:extLst>
       <p:ext uri="{BB962C8B-B14F-4D97-AF65-F5344CB8AC3E}">
-        <p14:creationId xmlns:p14="http://schemas.microsoft.com/office/powerpoint/2010/main" val="3572361725"/>
+        <p14:creationId xmlns:p14="http://schemas.microsoft.com/office/powerpoint/2010/main" val="3900066107"/>
       </p:ext>
     </p:extLst>
   </p:cSld>
@@ -771,13 +783,7 @@
       </p:grpSpPr>
       <p:sp>
         <p:nvSpPr>
-          <p:cNvPr id="2" name="Title 1">
-            <a:extLst>
-              <a:ext uri="{FF2B5EF4-FFF2-40B4-BE49-F238E27FC236}">
-                <a16:creationId xmlns:a16="http://schemas.microsoft.com/office/drawing/2014/main" id="{FA49B412-EBAB-4569-B3D9-6B346BF837B2}"/>
-              </a:ext>
-            </a:extLst>
-          </p:cNvPr>
+          <p:cNvPr id="2" name="Title 1"/>
           <p:cNvSpPr>
             <a:spLocks noGrp="1"/>
           </p:cNvSpPr>
@@ -785,21 +791,10 @@
             <p:ph type="title"/>
           </p:nvPr>
         </p:nvSpPr>
-        <p:spPr>
-          <a:xfrm>
-            <a:off x="1371600" y="685800"/>
-            <a:ext cx="9486900" cy="1371600"/>
-          </a:xfrm>
-        </p:spPr>
-        <p:txBody>
-          <a:bodyPr>
-            <a:normAutofit/>
-          </a:bodyPr>
-          <a:lstStyle>
-            <a:lvl1pPr algn="l">
-              <a:defRPr sz="3200" cap="all" spc="300" baseline="0"/>
-            </a:lvl1pPr>
-          </a:lstStyle>
+        <p:spPr/>
+        <p:txBody>
+          <a:bodyPr/>
+          <a:lstStyle/>
           <a:p>
             <a:r>
               <a:rPr lang="en-US"/>
@@ -811,13 +806,7 @@
       </p:sp>
       <p:sp>
         <p:nvSpPr>
-          <p:cNvPr id="3" name="Content Placeholder 2">
-            <a:extLst>
-              <a:ext uri="{FF2B5EF4-FFF2-40B4-BE49-F238E27FC236}">
-                <a16:creationId xmlns:a16="http://schemas.microsoft.com/office/drawing/2014/main" id="{95E7C8AE-B0F4-404F-BCAD-A14C18E50D99}"/>
-              </a:ext>
-            </a:extLst>
-          </p:cNvPr>
+          <p:cNvPr id="3" name="Content Placeholder 2"/>
           <p:cNvSpPr>
             <a:spLocks noGrp="1"/>
           </p:cNvSpPr>
@@ -869,13 +858,7 @@
       </p:sp>
       <p:sp>
         <p:nvSpPr>
-          <p:cNvPr id="4" name="Date Placeholder 3">
-            <a:extLst>
-              <a:ext uri="{FF2B5EF4-FFF2-40B4-BE49-F238E27FC236}">
-                <a16:creationId xmlns:a16="http://schemas.microsoft.com/office/drawing/2014/main" id="{B8AA9CAD-DAFB-4DE3-9C41-7FD03EA8D8DD}"/>
-              </a:ext>
-            </a:extLst>
-          </p:cNvPr>
+          <p:cNvPr id="4" name="Date Placeholder 3"/>
           <p:cNvSpPr>
             <a:spLocks noGrp="1"/>
           </p:cNvSpPr>
@@ -890,7 +873,7 @@
           <a:p>
             <a:fld id="{201AF2CE-4F37-411C-A3EE-BBBE223265BF}" type="datetime1">
               <a:rPr lang="en-US" smtClean="0"/>
-              <a:t>11/30/2022</a:t>
+              <a:t>12/6/2022</a:t>
             </a:fld>
             <a:endParaRPr lang="en-US"/>
           </a:p>
@@ -898,13 +881,7 @@
       </p:sp>
       <p:sp>
         <p:nvSpPr>
-          <p:cNvPr id="5" name="Footer Placeholder 4">
-            <a:extLst>
-              <a:ext uri="{FF2B5EF4-FFF2-40B4-BE49-F238E27FC236}">
-                <a16:creationId xmlns:a16="http://schemas.microsoft.com/office/drawing/2014/main" id="{8FCE3137-8136-46C5-AC2F-49E5F55E4C73}"/>
-              </a:ext>
-            </a:extLst>
-          </p:cNvPr>
+          <p:cNvPr id="5" name="Footer Placeholder 4"/>
           <p:cNvSpPr>
             <a:spLocks noGrp="1"/>
           </p:cNvSpPr>
@@ -926,13 +903,7 @@
       </p:sp>
       <p:sp>
         <p:nvSpPr>
-          <p:cNvPr id="6" name="Slide Number Placeholder 5">
-            <a:extLst>
-              <a:ext uri="{FF2B5EF4-FFF2-40B4-BE49-F238E27FC236}">
-                <a16:creationId xmlns:a16="http://schemas.microsoft.com/office/drawing/2014/main" id="{AF1AB6EF-A0B1-4706-AE44-253A6B182D48}"/>
-              </a:ext>
-            </a:extLst>
-          </p:cNvPr>
+          <p:cNvPr id="6" name="Slide Number Placeholder 5"/>
           <p:cNvSpPr>
             <a:spLocks noGrp="1"/>
           </p:cNvSpPr>
@@ -956,7 +927,7 @@
     </p:spTree>
     <p:extLst>
       <p:ext uri="{BB962C8B-B14F-4D97-AF65-F5344CB8AC3E}">
-        <p14:creationId xmlns:p14="http://schemas.microsoft.com/office/powerpoint/2010/main" val="916614029"/>
+        <p14:creationId xmlns:p14="http://schemas.microsoft.com/office/powerpoint/2010/main" val="335224139"/>
       </p:ext>
     </p:extLst>
   </p:cSld>
@@ -985,13 +956,7 @@
       </p:grpSpPr>
       <p:sp>
         <p:nvSpPr>
-          <p:cNvPr id="2" name="Title 1">
-            <a:extLst>
-              <a:ext uri="{FF2B5EF4-FFF2-40B4-BE49-F238E27FC236}">
-                <a16:creationId xmlns:a16="http://schemas.microsoft.com/office/drawing/2014/main" id="{44C02F68-BF19-468D-B422-54B6D189FA58}"/>
-              </a:ext>
-            </a:extLst>
-          </p:cNvPr>
+          <p:cNvPr id="2" name="Title 1"/>
           <p:cNvSpPr>
             <a:spLocks noGrp="1"/>
           </p:cNvSpPr>
@@ -1001,8 +966,8 @@
         </p:nvSpPr>
         <p:spPr>
           <a:xfrm>
-            <a:off x="831850" y="1709738"/>
-            <a:ext cx="10515600" cy="2774071"/>
+            <a:off x="3867912" y="1298448"/>
+            <a:ext cx="7315200" cy="3255264"/>
           </a:xfrm>
         </p:spPr>
         <p:txBody>
@@ -1010,8 +975,15 @@
             <a:normAutofit/>
           </a:bodyPr>
           <a:lstStyle>
-            <a:lvl1pPr algn="ctr">
-              <a:defRPr sz="5400"/>
+            <a:lvl1pPr>
+              <a:defRPr sz="5900" b="0" spc="-100" baseline="0">
+                <a:solidFill>
+                  <a:schemeClr val="tx1">
+                    <a:lumMod val="65000"/>
+                    <a:lumOff val="35000"/>
+                  </a:schemeClr>
+                </a:solidFill>
+              </a:defRPr>
             </a:lvl1pPr>
           </a:lstStyle>
           <a:p>
@@ -1025,13 +997,7 @@
       </p:sp>
       <p:sp>
         <p:nvSpPr>
-          <p:cNvPr id="3" name="Text Placeholder 2">
-            <a:extLst>
-              <a:ext uri="{FF2B5EF4-FFF2-40B4-BE49-F238E27FC236}">
-                <a16:creationId xmlns:a16="http://schemas.microsoft.com/office/drawing/2014/main" id="{7BCBF7D7-84D4-4A39-B44E-9B029EEB1FE8}"/>
-              </a:ext>
-            </a:extLst>
-          </p:cNvPr>
+          <p:cNvPr id="3" name="Text Placeholder 2"/>
           <p:cNvSpPr>
             <a:spLocks noGrp="1"/>
           </p:cNvSpPr>
@@ -1041,26 +1007,29 @@
         </p:nvSpPr>
         <p:spPr>
           <a:xfrm>
-            <a:off x="831850" y="4641624"/>
-            <a:ext cx="10515600" cy="1448026"/>
+            <a:off x="3886200" y="4672584"/>
+            <a:ext cx="7315200" cy="914400"/>
           </a:xfrm>
         </p:spPr>
         <p:txBody>
-          <a:bodyPr/>
+          <a:bodyPr anchor="t">
+            <a:normAutofit/>
+          </a:bodyPr>
           <a:lstStyle>
-            <a:lvl1pPr marL="0" indent="0" algn="ctr">
-              <a:buNone/>
-              <a:defRPr sz="2400" i="1">
+            <a:lvl1pPr marL="0" indent="0">
+              <a:buNone/>
+              <a:defRPr sz="2200" cap="none" spc="0" baseline="0">
                 <a:solidFill>
                   <a:schemeClr val="tx1">
-                    <a:tint val="75000"/>
+                    <a:lumMod val="65000"/>
+                    <a:lumOff val="35000"/>
                   </a:schemeClr>
                 </a:solidFill>
               </a:defRPr>
             </a:lvl1pPr>
             <a:lvl2pPr marL="457200" indent="0">
               <a:buNone/>
-              <a:defRPr sz="2000">
+              <a:defRPr sz="1800">
                 <a:solidFill>
                   <a:schemeClr val="tx1">
                     <a:tint val="75000"/>
@@ -1070,7 +1039,7 @@
             </a:lvl2pPr>
             <a:lvl3pPr marL="914400" indent="0">
               <a:buNone/>
-              <a:defRPr sz="1800">
+              <a:defRPr sz="1600">
                 <a:solidFill>
                   <a:schemeClr val="tx1">
                     <a:tint val="75000"/>
@@ -1080,7 +1049,7 @@
             </a:lvl3pPr>
             <a:lvl4pPr marL="1371600" indent="0">
               <a:buNone/>
-              <a:defRPr sz="1600">
+              <a:defRPr sz="1400">
                 <a:solidFill>
                   <a:schemeClr val="tx1">
                     <a:tint val="75000"/>
@@ -1090,7 +1059,7 @@
             </a:lvl4pPr>
             <a:lvl5pPr marL="1828800" indent="0">
               <a:buNone/>
-              <a:defRPr sz="1600">
+              <a:defRPr sz="1400">
                 <a:solidFill>
                   <a:schemeClr val="tx1">
                     <a:tint val="75000"/>
@@ -1100,7 +1069,7 @@
             </a:lvl5pPr>
             <a:lvl6pPr marL="2286000" indent="0">
               <a:buNone/>
-              <a:defRPr sz="1600">
+              <a:defRPr sz="1400">
                 <a:solidFill>
                   <a:schemeClr val="tx1">
                     <a:tint val="75000"/>
@@ -1110,7 +1079,7 @@
             </a:lvl6pPr>
             <a:lvl7pPr marL="2743200" indent="0">
               <a:buNone/>
-              <a:defRPr sz="1600">
+              <a:defRPr sz="1400">
                 <a:solidFill>
                   <a:schemeClr val="tx1">
                     <a:tint val="75000"/>
@@ -1120,7 +1089,7 @@
             </a:lvl7pPr>
             <a:lvl8pPr marL="3200400" indent="0">
               <a:buNone/>
-              <a:defRPr sz="1600">
+              <a:defRPr sz="1400">
                 <a:solidFill>
                   <a:schemeClr val="tx1">
                     <a:tint val="75000"/>
@@ -1130,7 +1099,7 @@
             </a:lvl8pPr>
             <a:lvl9pPr marL="3657600" indent="0">
               <a:buNone/>
-              <a:defRPr sz="1600">
+              <a:defRPr sz="1400">
                 <a:solidFill>
                   <a:schemeClr val="tx1">
                     <a:tint val="75000"/>
@@ -1150,13 +1119,7 @@
       </p:sp>
       <p:sp>
         <p:nvSpPr>
-          <p:cNvPr id="4" name="Date Placeholder 3">
-            <a:extLst>
-              <a:ext uri="{FF2B5EF4-FFF2-40B4-BE49-F238E27FC236}">
-                <a16:creationId xmlns:a16="http://schemas.microsoft.com/office/drawing/2014/main" id="{89E29709-D243-41E8-89FA-62FA7AEB52E1}"/>
-              </a:ext>
-            </a:extLst>
-          </p:cNvPr>
+          <p:cNvPr id="4" name="Date Placeholder 3"/>
           <p:cNvSpPr>
             <a:spLocks noGrp="1"/>
           </p:cNvSpPr>
@@ -1171,7 +1134,7 @@
           <a:p>
             <a:fld id="{C96083D4-708C-4BB5-B4FD-30CE9FA12FD5}" type="datetime1">
               <a:rPr lang="en-US" smtClean="0"/>
-              <a:t>11/30/2022</a:t>
+              <a:t>12/6/2022</a:t>
             </a:fld>
             <a:endParaRPr lang="en-US"/>
           </a:p>
@@ -1179,13 +1142,7 @@
       </p:sp>
       <p:sp>
         <p:nvSpPr>
-          <p:cNvPr id="5" name="Footer Placeholder 4">
-            <a:extLst>
-              <a:ext uri="{FF2B5EF4-FFF2-40B4-BE49-F238E27FC236}">
-                <a16:creationId xmlns:a16="http://schemas.microsoft.com/office/drawing/2014/main" id="{5AAB99C0-DC2A-4133-A10D-D43A1E05BB1A}"/>
-              </a:ext>
-            </a:extLst>
-          </p:cNvPr>
+          <p:cNvPr id="5" name="Footer Placeholder 4"/>
           <p:cNvSpPr>
             <a:spLocks noGrp="1"/>
           </p:cNvSpPr>
@@ -1199,21 +1156,16 @@
           <a:lstStyle/>
           <a:p>
             <a:r>
-              <a:rPr lang="en-US" dirty="0"/>
+              <a:rPr lang="en-US"/>
               <a:t>Sample Footer Text</a:t>
             </a:r>
-          </a:p>
-        </p:txBody>
-      </p:sp>
-      <p:sp>
-        <p:nvSpPr>
-          <p:cNvPr id="6" name="Slide Number Placeholder 5">
-            <a:extLst>
-              <a:ext uri="{FF2B5EF4-FFF2-40B4-BE49-F238E27FC236}">
-                <a16:creationId xmlns:a16="http://schemas.microsoft.com/office/drawing/2014/main" id="{98122EFD-A17E-47F5-8AC9-EFD6D813DBE7}"/>
-              </a:ext>
-            </a:extLst>
-          </p:cNvPr>
+            <a:endParaRPr lang="en-US" dirty="0"/>
+          </a:p>
+        </p:txBody>
+      </p:sp>
+      <p:sp>
+        <p:nvSpPr>
+          <p:cNvPr id="6" name="Slide Number Placeholder 5"/>
           <p:cNvSpPr>
             <a:spLocks noGrp="1"/>
           </p:cNvSpPr>
@@ -1237,7 +1189,7 @@
     </p:spTree>
     <p:extLst>
       <p:ext uri="{BB962C8B-B14F-4D97-AF65-F5344CB8AC3E}">
-        <p14:creationId xmlns:p14="http://schemas.microsoft.com/office/powerpoint/2010/main" val="2259815034"/>
+        <p14:creationId xmlns:p14="http://schemas.microsoft.com/office/powerpoint/2010/main" val="3005445725"/>
       </p:ext>
     </p:extLst>
   </p:cSld>
@@ -1266,37 +1218,107 @@
       </p:grpSpPr>
       <p:sp>
         <p:nvSpPr>
-          <p:cNvPr id="2" name="Title 1">
-            <a:extLst>
-              <a:ext uri="{FF2B5EF4-FFF2-40B4-BE49-F238E27FC236}">
-                <a16:creationId xmlns:a16="http://schemas.microsoft.com/office/drawing/2014/main" id="{5E1C668D-BFBE-4765-A294-8303931B57C9}"/>
-              </a:ext>
-            </a:extLst>
-          </p:cNvPr>
+          <p:cNvPr id="2" name="Title 1"/>
           <p:cNvSpPr>
             <a:spLocks noGrp="1"/>
           </p:cNvSpPr>
           <p:nvPr>
             <p:ph type="title"/>
+          </p:nvPr>
+        </p:nvSpPr>
+        <p:spPr/>
+        <p:txBody>
+          <a:bodyPr/>
+          <a:lstStyle/>
+          <a:p>
+            <a:r>
+              <a:rPr lang="en-US"/>
+              <a:t>Click to edit Master title style</a:t>
+            </a:r>
+            <a:endParaRPr lang="en-US" dirty="0"/>
+          </a:p>
+        </p:txBody>
+      </p:sp>
+      <p:sp>
+        <p:nvSpPr>
+          <p:cNvPr id="3" name="Content Placeholder 2"/>
+          <p:cNvSpPr>
+            <a:spLocks noGrp="1"/>
+          </p:cNvSpPr>
+          <p:nvPr>
+            <p:ph sz="half" idx="1"/>
           </p:nvPr>
         </p:nvSpPr>
         <p:spPr>
           <a:xfrm>
-            <a:off x="1346071" y="566278"/>
-            <a:ext cx="9512429" cy="965458"/>
+            <a:off x="3867912" y="868680"/>
+            <a:ext cx="3474720" cy="5120640"/>
           </a:xfrm>
         </p:spPr>
         <p:txBody>
           <a:bodyPr/>
           <a:lstStyle>
-            <a:lvl1pPr algn="ctr">
-              <a:defRPr cap="all" spc="300" baseline="0"/>
+            <a:lvl1pPr>
+              <a:defRPr sz="2000"/>
             </a:lvl1pPr>
+            <a:lvl2pPr>
+              <a:defRPr sz="1800"/>
+            </a:lvl2pPr>
+            <a:lvl3pPr>
+              <a:defRPr sz="1600"/>
+            </a:lvl3pPr>
+            <a:lvl4pPr>
+              <a:defRPr sz="1400"/>
+            </a:lvl4pPr>
+            <a:lvl5pPr>
+              <a:defRPr sz="1400"/>
+            </a:lvl5pPr>
+            <a:lvl6pPr>
+              <a:defRPr sz="1400"/>
+            </a:lvl6pPr>
+            <a:lvl7pPr>
+              <a:defRPr sz="1400"/>
+            </a:lvl7pPr>
+            <a:lvl8pPr>
+              <a:defRPr sz="1400"/>
+            </a:lvl8pPr>
+            <a:lvl9pPr>
+              <a:defRPr sz="1400"/>
+            </a:lvl9pPr>
           </a:lstStyle>
           <a:p>
-            <a:r>
-              <a:rPr lang="en-US"/>
-              <a:t>Click to edit Master title style</a:t>
+            <a:pPr lvl="0"/>
+            <a:r>
+              <a:rPr lang="en-US"/>
+              <a:t>Click to edit Master text styles</a:t>
+            </a:r>
+          </a:p>
+          <a:p>
+            <a:pPr lvl="1"/>
+            <a:r>
+              <a:rPr lang="en-US"/>
+              <a:t>Second level</a:t>
+            </a:r>
+          </a:p>
+          <a:p>
+            <a:pPr lvl="2"/>
+            <a:r>
+              <a:rPr lang="en-US"/>
+              <a:t>Third level</a:t>
+            </a:r>
+          </a:p>
+          <a:p>
+            <a:pPr lvl="3"/>
+            <a:r>
+              <a:rPr lang="en-US"/>
+              <a:t>Fourth level</a:t>
+            </a:r>
+          </a:p>
+          <a:p>
+            <a:pPr lvl="4"/>
+            <a:r>
+              <a:rPr lang="en-US"/>
+              <a:t>Fifth level</a:t>
             </a:r>
             <a:endParaRPr lang="en-US" dirty="0"/>
           </a:p>
@@ -1304,29 +1326,51 @@
       </p:sp>
       <p:sp>
         <p:nvSpPr>
-          <p:cNvPr id="3" name="Content Placeholder 2">
-            <a:extLst>
-              <a:ext uri="{FF2B5EF4-FFF2-40B4-BE49-F238E27FC236}">
-                <a16:creationId xmlns:a16="http://schemas.microsoft.com/office/drawing/2014/main" id="{61B3C212-F55F-4D0D-BFA7-F00A33CAA196}"/>
-              </a:ext>
-            </a:extLst>
-          </p:cNvPr>
-          <p:cNvSpPr>
-            <a:spLocks noGrp="1"/>
-          </p:cNvSpPr>
-          <p:nvPr>
-            <p:ph sz="half" idx="1"/>
+          <p:cNvPr id="4" name="Content Placeholder 3"/>
+          <p:cNvSpPr>
+            <a:spLocks noGrp="1"/>
+          </p:cNvSpPr>
+          <p:nvPr>
+            <p:ph sz="half" idx="2"/>
           </p:nvPr>
         </p:nvSpPr>
         <p:spPr>
           <a:xfrm>
-            <a:off x="909758" y="2057400"/>
-            <a:ext cx="5031521" cy="4119563"/>
+            <a:off x="7818120" y="868680"/>
+            <a:ext cx="3474720" cy="5120640"/>
           </a:xfrm>
         </p:spPr>
         <p:txBody>
           <a:bodyPr/>
-          <a:lstStyle/>
+          <a:lstStyle>
+            <a:lvl1pPr>
+              <a:defRPr sz="2000"/>
+            </a:lvl1pPr>
+            <a:lvl2pPr>
+              <a:defRPr sz="1800"/>
+            </a:lvl2pPr>
+            <a:lvl3pPr>
+              <a:defRPr sz="1600"/>
+            </a:lvl3pPr>
+            <a:lvl4pPr>
+              <a:defRPr sz="1400"/>
+            </a:lvl4pPr>
+            <a:lvl5pPr>
+              <a:defRPr sz="1400"/>
+            </a:lvl5pPr>
+            <a:lvl6pPr>
+              <a:defRPr sz="1400"/>
+            </a:lvl6pPr>
+            <a:lvl7pPr>
+              <a:defRPr sz="1400"/>
+            </a:lvl7pPr>
+            <a:lvl8pPr>
+              <a:defRPr sz="1400"/>
+            </a:lvl8pPr>
+            <a:lvl9pPr>
+              <a:defRPr sz="1400"/>
+            </a:lvl9pPr>
+          </a:lstStyle>
           <a:p>
             <a:pPr lvl="0"/>
             <a:r>
@@ -1367,76 +1411,7 @@
       </p:sp>
       <p:sp>
         <p:nvSpPr>
-          <p:cNvPr id="4" name="Content Placeholder 3">
-            <a:extLst>
-              <a:ext uri="{FF2B5EF4-FFF2-40B4-BE49-F238E27FC236}">
-                <a16:creationId xmlns:a16="http://schemas.microsoft.com/office/drawing/2014/main" id="{7154BDD7-2575-4E82-887D-DCAF9EB15924}"/>
-              </a:ext>
-            </a:extLst>
-          </p:cNvPr>
-          <p:cNvSpPr>
-            <a:spLocks noGrp="1"/>
-          </p:cNvSpPr>
-          <p:nvPr>
-            <p:ph sz="half" idx="2"/>
-          </p:nvPr>
-        </p:nvSpPr>
-        <p:spPr>
-          <a:xfrm>
-            <a:off x="6265408" y="2057401"/>
-            <a:ext cx="5016834" cy="4119562"/>
-          </a:xfrm>
-        </p:spPr>
-        <p:txBody>
-          <a:bodyPr/>
-          <a:lstStyle/>
-          <a:p>
-            <a:pPr lvl="0"/>
-            <a:r>
-              <a:rPr lang="en-US"/>
-              <a:t>Click to edit Master text styles</a:t>
-            </a:r>
-          </a:p>
-          <a:p>
-            <a:pPr lvl="1"/>
-            <a:r>
-              <a:rPr lang="en-US"/>
-              <a:t>Second level</a:t>
-            </a:r>
-          </a:p>
-          <a:p>
-            <a:pPr lvl="2"/>
-            <a:r>
-              <a:rPr lang="en-US"/>
-              <a:t>Third level</a:t>
-            </a:r>
-          </a:p>
-          <a:p>
-            <a:pPr lvl="3"/>
-            <a:r>
-              <a:rPr lang="en-US"/>
-              <a:t>Fourth level</a:t>
-            </a:r>
-          </a:p>
-          <a:p>
-            <a:pPr lvl="4"/>
-            <a:r>
-              <a:rPr lang="en-US"/>
-              <a:t>Fifth level</a:t>
-            </a:r>
-            <a:endParaRPr lang="en-US" dirty="0"/>
-          </a:p>
-        </p:txBody>
-      </p:sp>
-      <p:sp>
-        <p:nvSpPr>
-          <p:cNvPr id="5" name="Date Placeholder 4">
-            <a:extLst>
-              <a:ext uri="{FF2B5EF4-FFF2-40B4-BE49-F238E27FC236}">
-                <a16:creationId xmlns:a16="http://schemas.microsoft.com/office/drawing/2014/main" id="{89CAECC8-3C3A-4A5D-AB7A-1F99E5023D3F}"/>
-              </a:ext>
-            </a:extLst>
-          </p:cNvPr>
+          <p:cNvPr id="8" name="Date Placeholder 7"/>
           <p:cNvSpPr>
             <a:spLocks noGrp="1"/>
           </p:cNvSpPr>
@@ -1451,7 +1426,7 @@
           <a:p>
             <a:fld id="{D0D239B2-65BC-4C2A-A62B-3EABFE9590E4}" type="datetime1">
               <a:rPr lang="en-US" smtClean="0"/>
-              <a:t>11/30/2022</a:t>
+              <a:t>12/6/2022</a:t>
             </a:fld>
             <a:endParaRPr lang="en-US"/>
           </a:p>
@@ -1459,13 +1434,7 @@
       </p:sp>
       <p:sp>
         <p:nvSpPr>
-          <p:cNvPr id="6" name="Footer Placeholder 5">
-            <a:extLst>
-              <a:ext uri="{FF2B5EF4-FFF2-40B4-BE49-F238E27FC236}">
-                <a16:creationId xmlns:a16="http://schemas.microsoft.com/office/drawing/2014/main" id="{4447609B-ACA4-4323-9340-C7DB166D7A50}"/>
-              </a:ext>
-            </a:extLst>
-          </p:cNvPr>
+          <p:cNvPr id="9" name="Footer Placeholder 8"/>
           <p:cNvSpPr>
             <a:spLocks noGrp="1"/>
           </p:cNvSpPr>
@@ -1487,13 +1456,7 @@
       </p:sp>
       <p:sp>
         <p:nvSpPr>
-          <p:cNvPr id="7" name="Slide Number Placeholder 6">
-            <a:extLst>
-              <a:ext uri="{FF2B5EF4-FFF2-40B4-BE49-F238E27FC236}">
-                <a16:creationId xmlns:a16="http://schemas.microsoft.com/office/drawing/2014/main" id="{77409EA3-C5C7-4AC6-956A-DB9A3B4F3142}"/>
-              </a:ext>
-            </a:extLst>
-          </p:cNvPr>
+          <p:cNvPr id="10" name="Slide Number Placeholder 9"/>
           <p:cNvSpPr>
             <a:spLocks noGrp="1"/>
           </p:cNvSpPr>
@@ -1517,7 +1480,7 @@
     </p:spTree>
     <p:extLst>
       <p:ext uri="{BB962C8B-B14F-4D97-AF65-F5344CB8AC3E}">
-        <p14:creationId xmlns:p14="http://schemas.microsoft.com/office/powerpoint/2010/main" val="2049555761"/>
+        <p14:creationId xmlns:p14="http://schemas.microsoft.com/office/powerpoint/2010/main" val="2398035284"/>
       </p:ext>
     </p:extLst>
   </p:cSld>
@@ -1546,72 +1509,61 @@
       </p:grpSpPr>
       <p:sp>
         <p:nvSpPr>
-          <p:cNvPr id="2" name="Title 1">
-            <a:extLst>
-              <a:ext uri="{FF2B5EF4-FFF2-40B4-BE49-F238E27FC236}">
-                <a16:creationId xmlns:a16="http://schemas.microsoft.com/office/drawing/2014/main" id="{BAE0CDE0-7431-4F05-AA47-F10EB46C9608}"/>
-              </a:ext>
-            </a:extLst>
-          </p:cNvPr>
+          <p:cNvPr id="10" name="Title 9"/>
           <p:cNvSpPr>
             <a:spLocks noGrp="1"/>
           </p:cNvSpPr>
           <p:nvPr>
             <p:ph type="title"/>
+          </p:nvPr>
+        </p:nvSpPr>
+        <p:spPr/>
+        <p:txBody>
+          <a:bodyPr/>
+          <a:lstStyle/>
+          <a:p>
+            <a:r>
+              <a:rPr lang="en-US"/>
+              <a:t>Click to edit Master title style</a:t>
+            </a:r>
+            <a:endParaRPr lang="en-US" dirty="0"/>
+          </a:p>
+        </p:txBody>
+      </p:sp>
+      <p:sp>
+        <p:nvSpPr>
+          <p:cNvPr id="3" name="Text Placeholder 2"/>
+          <p:cNvSpPr>
+            <a:spLocks noGrp="1"/>
+          </p:cNvSpPr>
+          <p:nvPr>
+            <p:ph type="body" idx="1"/>
           </p:nvPr>
         </p:nvSpPr>
         <p:spPr>
           <a:xfrm>
-            <a:off x="839788" y="365126"/>
-            <a:ext cx="10276552" cy="1149350"/>
+            <a:off x="3867912" y="1023586"/>
+            <a:ext cx="3474720" cy="807720"/>
           </a:xfrm>
         </p:spPr>
         <p:txBody>
-          <a:bodyPr>
+          <a:bodyPr anchor="b">
             <a:normAutofit/>
           </a:bodyPr>
           <a:lstStyle>
-            <a:lvl1pPr algn="ctr">
-              <a:defRPr sz="3200" cap="all" spc="300" baseline="0"/>
-            </a:lvl1pPr>
-          </a:lstStyle>
-          <a:p>
-            <a:r>
-              <a:rPr lang="en-US"/>
-              <a:t>Click to edit Master title style</a:t>
-            </a:r>
-            <a:endParaRPr lang="en-US" dirty="0"/>
-          </a:p>
-        </p:txBody>
-      </p:sp>
-      <p:sp>
-        <p:nvSpPr>
-          <p:cNvPr id="3" name="Text Placeholder 2">
-            <a:extLst>
-              <a:ext uri="{FF2B5EF4-FFF2-40B4-BE49-F238E27FC236}">
-                <a16:creationId xmlns:a16="http://schemas.microsoft.com/office/drawing/2014/main" id="{06D9FFA7-D3EA-4CB8-A471-94235AD62592}"/>
-              </a:ext>
-            </a:extLst>
-          </p:cNvPr>
-          <p:cNvSpPr>
-            <a:spLocks noGrp="1"/>
-          </p:cNvSpPr>
-          <p:nvPr>
-            <p:ph type="body" idx="1"/>
-          </p:nvPr>
-        </p:nvSpPr>
-        <p:spPr>
-          <a:xfrm>
-            <a:off x="839788" y="1681163"/>
-            <a:ext cx="5157787" cy="823912"/>
-          </a:xfrm>
-        </p:spPr>
-        <p:txBody>
-          <a:bodyPr anchor="b"/>
-          <a:lstStyle>
             <a:lvl1pPr marL="0" indent="0">
-              <a:buNone/>
-              <a:defRPr sz="2400" b="1" i="0"/>
+              <a:spcBef>
+                <a:spcPts val="0"/>
+              </a:spcBef>
+              <a:buNone/>
+              <a:defRPr sz="2000" b="1">
+                <a:solidFill>
+                  <a:schemeClr val="tx1">
+                    <a:lumMod val="65000"/>
+                    <a:lumOff val="35000"/>
+                  </a:schemeClr>
+                </a:solidFill>
+              </a:defRPr>
             </a:lvl1pPr>
             <a:lvl2pPr marL="457200" indent="0">
               <a:buNone/>
@@ -1657,13 +1609,7 @@
       </p:sp>
       <p:sp>
         <p:nvSpPr>
-          <p:cNvPr id="4" name="Content Placeholder 3">
-            <a:extLst>
-              <a:ext uri="{FF2B5EF4-FFF2-40B4-BE49-F238E27FC236}">
-                <a16:creationId xmlns:a16="http://schemas.microsoft.com/office/drawing/2014/main" id="{F05360D2-88E8-43C8-92D1-67AB23BBE268}"/>
-              </a:ext>
-            </a:extLst>
-          </p:cNvPr>
+          <p:cNvPr id="4" name="Content Placeholder 3"/>
           <p:cNvSpPr>
             <a:spLocks noGrp="1"/>
           </p:cNvSpPr>
@@ -1673,13 +1619,41 @@
         </p:nvSpPr>
         <p:spPr>
           <a:xfrm>
-            <a:off x="839788" y="2505075"/>
-            <a:ext cx="5157787" cy="3684588"/>
+            <a:off x="3867912" y="1930936"/>
+            <a:ext cx="3474720" cy="4023360"/>
           </a:xfrm>
         </p:spPr>
         <p:txBody>
           <a:bodyPr/>
-          <a:lstStyle/>
+          <a:lstStyle>
+            <a:lvl1pPr>
+              <a:defRPr sz="2000"/>
+            </a:lvl1pPr>
+            <a:lvl2pPr>
+              <a:defRPr sz="1800"/>
+            </a:lvl2pPr>
+            <a:lvl3pPr>
+              <a:defRPr sz="1600"/>
+            </a:lvl3pPr>
+            <a:lvl4pPr>
+              <a:defRPr sz="1400"/>
+            </a:lvl4pPr>
+            <a:lvl5pPr>
+              <a:defRPr sz="1400"/>
+            </a:lvl5pPr>
+            <a:lvl6pPr>
+              <a:defRPr sz="1400"/>
+            </a:lvl6pPr>
+            <a:lvl7pPr>
+              <a:defRPr sz="1400"/>
+            </a:lvl7pPr>
+            <a:lvl8pPr>
+              <a:defRPr sz="1400"/>
+            </a:lvl8pPr>
+            <a:lvl9pPr>
+              <a:defRPr sz="1400"/>
+            </a:lvl9pPr>
+          </a:lstStyle>
           <a:p>
             <a:pPr lvl="0"/>
             <a:r>
@@ -1714,18 +1688,13 @@
               <a:rPr lang="en-US"/>
               <a:t>Fifth level</a:t>
             </a:r>
-          </a:p>
-        </p:txBody>
-      </p:sp>
-      <p:sp>
-        <p:nvSpPr>
-          <p:cNvPr id="5" name="Text Placeholder 4">
-            <a:extLst>
-              <a:ext uri="{FF2B5EF4-FFF2-40B4-BE49-F238E27FC236}">
-                <a16:creationId xmlns:a16="http://schemas.microsoft.com/office/drawing/2014/main" id="{65C768F6-20A1-47A1-90FE-903135EEFD59}"/>
-              </a:ext>
-            </a:extLst>
-          </p:cNvPr>
+            <a:endParaRPr lang="en-US" dirty="0"/>
+          </a:p>
+        </p:txBody>
+      </p:sp>
+      <p:sp>
+        <p:nvSpPr>
+          <p:cNvPr id="5" name="Text Placeholder 4"/>
           <p:cNvSpPr>
             <a:spLocks noGrp="1"/>
           </p:cNvSpPr>
@@ -1735,16 +1704,28 @@
         </p:nvSpPr>
         <p:spPr>
           <a:xfrm>
-            <a:off x="6172200" y="1681163"/>
-            <a:ext cx="5183188" cy="823912"/>
+            <a:off x="7818463" y="1023586"/>
+            <a:ext cx="3474720" cy="813171"/>
           </a:xfrm>
         </p:spPr>
         <p:txBody>
-          <a:bodyPr anchor="b"/>
+          <a:bodyPr anchor="b">
+            <a:normAutofit/>
+          </a:bodyPr>
           <a:lstStyle>
             <a:lvl1pPr marL="0" indent="0">
-              <a:buNone/>
-              <a:defRPr sz="2400" b="1"/>
+              <a:spcBef>
+                <a:spcPts val="0"/>
+              </a:spcBef>
+              <a:buNone/>
+              <a:defRPr sz="2000" b="1">
+                <a:solidFill>
+                  <a:schemeClr val="tx1">
+                    <a:lumMod val="65000"/>
+                    <a:lumOff val="35000"/>
+                  </a:schemeClr>
+                </a:solidFill>
+              </a:defRPr>
             </a:lvl1pPr>
             <a:lvl2pPr marL="457200" indent="0">
               <a:buNone/>
@@ -1790,13 +1771,7 @@
       </p:sp>
       <p:sp>
         <p:nvSpPr>
-          <p:cNvPr id="6" name="Content Placeholder 5">
-            <a:extLst>
-              <a:ext uri="{FF2B5EF4-FFF2-40B4-BE49-F238E27FC236}">
-                <a16:creationId xmlns:a16="http://schemas.microsoft.com/office/drawing/2014/main" id="{AD555EC1-268F-4324-A003-3608AA0D847E}"/>
-              </a:ext>
-            </a:extLst>
-          </p:cNvPr>
+          <p:cNvPr id="6" name="Content Placeholder 5"/>
           <p:cNvSpPr>
             <a:spLocks noGrp="1"/>
           </p:cNvSpPr>
@@ -1806,13 +1781,41 @@
         </p:nvSpPr>
         <p:spPr>
           <a:xfrm>
-            <a:off x="6172200" y="2505075"/>
-            <a:ext cx="5183188" cy="3684588"/>
+            <a:off x="7818463" y="1930936"/>
+            <a:ext cx="3474720" cy="4023360"/>
           </a:xfrm>
         </p:spPr>
         <p:txBody>
           <a:bodyPr/>
-          <a:lstStyle/>
+          <a:lstStyle>
+            <a:lvl1pPr>
+              <a:defRPr sz="2000"/>
+            </a:lvl1pPr>
+            <a:lvl2pPr>
+              <a:defRPr sz="1800"/>
+            </a:lvl2pPr>
+            <a:lvl3pPr>
+              <a:defRPr sz="1600"/>
+            </a:lvl3pPr>
+            <a:lvl4pPr>
+              <a:defRPr sz="1400"/>
+            </a:lvl4pPr>
+            <a:lvl5pPr>
+              <a:defRPr sz="1400"/>
+            </a:lvl5pPr>
+            <a:lvl6pPr>
+              <a:defRPr sz="1400"/>
+            </a:lvl6pPr>
+            <a:lvl7pPr>
+              <a:defRPr sz="1400"/>
+            </a:lvl7pPr>
+            <a:lvl8pPr>
+              <a:defRPr sz="1400"/>
+            </a:lvl8pPr>
+            <a:lvl9pPr>
+              <a:defRPr sz="1400"/>
+            </a:lvl9pPr>
+          </a:lstStyle>
           <a:p>
             <a:pPr lvl="0"/>
             <a:r>
@@ -1847,18 +1850,13 @@
               <a:rPr lang="en-US"/>
               <a:t>Fifth level</a:t>
             </a:r>
-          </a:p>
-        </p:txBody>
-      </p:sp>
-      <p:sp>
-        <p:nvSpPr>
-          <p:cNvPr id="7" name="Date Placeholder 6">
-            <a:extLst>
-              <a:ext uri="{FF2B5EF4-FFF2-40B4-BE49-F238E27FC236}">
-                <a16:creationId xmlns:a16="http://schemas.microsoft.com/office/drawing/2014/main" id="{9C55C8E4-FCB8-4E06-9C43-0ACD949A73D4}"/>
-              </a:ext>
-            </a:extLst>
-          </p:cNvPr>
+            <a:endParaRPr lang="en-US" dirty="0"/>
+          </a:p>
+        </p:txBody>
+      </p:sp>
+      <p:sp>
+        <p:nvSpPr>
+          <p:cNvPr id="2" name="Date Placeholder 1"/>
           <p:cNvSpPr>
             <a:spLocks noGrp="1"/>
           </p:cNvSpPr>
@@ -1873,7 +1871,7 @@
           <a:p>
             <a:fld id="{85E05F5A-E4A3-476F-A89E-C2B73F2431E4}" type="datetime1">
               <a:rPr lang="en-US" smtClean="0"/>
-              <a:t>11/30/2022</a:t>
+              <a:t>12/6/2022</a:t>
             </a:fld>
             <a:endParaRPr lang="en-US"/>
           </a:p>
@@ -1881,13 +1879,7 @@
       </p:sp>
       <p:sp>
         <p:nvSpPr>
-          <p:cNvPr id="8" name="Footer Placeholder 7">
-            <a:extLst>
-              <a:ext uri="{FF2B5EF4-FFF2-40B4-BE49-F238E27FC236}">
-                <a16:creationId xmlns:a16="http://schemas.microsoft.com/office/drawing/2014/main" id="{8B01C005-C973-4D82-942A-334F1D431A04}"/>
-              </a:ext>
-            </a:extLst>
-          </p:cNvPr>
+          <p:cNvPr id="11" name="Footer Placeholder 10"/>
           <p:cNvSpPr>
             <a:spLocks noGrp="1"/>
           </p:cNvSpPr>
@@ -1909,13 +1901,7 @@
       </p:sp>
       <p:sp>
         <p:nvSpPr>
-          <p:cNvPr id="9" name="Slide Number Placeholder 8">
-            <a:extLst>
-              <a:ext uri="{FF2B5EF4-FFF2-40B4-BE49-F238E27FC236}">
-                <a16:creationId xmlns:a16="http://schemas.microsoft.com/office/drawing/2014/main" id="{AAFB6186-6570-4DE8-8603-70B0A51DFE9C}"/>
-              </a:ext>
-            </a:extLst>
-          </p:cNvPr>
+          <p:cNvPr id="12" name="Slide Number Placeholder 11"/>
           <p:cNvSpPr>
             <a:spLocks noGrp="1"/>
           </p:cNvSpPr>
@@ -1939,7 +1925,7 @@
     </p:spTree>
     <p:extLst>
       <p:ext uri="{BB962C8B-B14F-4D97-AF65-F5344CB8AC3E}">
-        <p14:creationId xmlns:p14="http://schemas.microsoft.com/office/powerpoint/2010/main" val="1576173409"/>
+        <p14:creationId xmlns:p14="http://schemas.microsoft.com/office/powerpoint/2010/main" val="2774587216"/>
       </p:ext>
     </p:extLst>
   </p:cSld>
@@ -1968,13 +1954,7 @@
       </p:grpSpPr>
       <p:sp>
         <p:nvSpPr>
-          <p:cNvPr id="2" name="Title 1">
-            <a:extLst>
-              <a:ext uri="{FF2B5EF4-FFF2-40B4-BE49-F238E27FC236}">
-                <a16:creationId xmlns:a16="http://schemas.microsoft.com/office/drawing/2014/main" id="{EDA5ADD3-88C8-4B01-8CC6-808C0E416054}"/>
-              </a:ext>
-            </a:extLst>
-          </p:cNvPr>
+          <p:cNvPr id="6" name="Title 5"/>
           <p:cNvSpPr>
             <a:spLocks noGrp="1"/>
           </p:cNvSpPr>
@@ -1997,13 +1977,7 @@
       </p:sp>
       <p:sp>
         <p:nvSpPr>
-          <p:cNvPr id="3" name="Date Placeholder 2">
-            <a:extLst>
-              <a:ext uri="{FF2B5EF4-FFF2-40B4-BE49-F238E27FC236}">
-                <a16:creationId xmlns:a16="http://schemas.microsoft.com/office/drawing/2014/main" id="{02634E6A-1390-4101-B78E-7592313407D7}"/>
-              </a:ext>
-            </a:extLst>
-          </p:cNvPr>
+          <p:cNvPr id="2" name="Date Placeholder 1"/>
           <p:cNvSpPr>
             <a:spLocks noGrp="1"/>
           </p:cNvSpPr>
@@ -2018,7 +1992,7 @@
           <a:p>
             <a:fld id="{E3761515-4A26-4F31-9F61-5A10B1FABBFC}" type="datetime1">
               <a:rPr lang="en-US" smtClean="0"/>
-              <a:t>11/30/2022</a:t>
+              <a:t>12/6/2022</a:t>
             </a:fld>
             <a:endParaRPr lang="en-US"/>
           </a:p>
@@ -2026,13 +2000,7 @@
       </p:sp>
       <p:sp>
         <p:nvSpPr>
-          <p:cNvPr id="4" name="Footer Placeholder 3">
-            <a:extLst>
-              <a:ext uri="{FF2B5EF4-FFF2-40B4-BE49-F238E27FC236}">
-                <a16:creationId xmlns:a16="http://schemas.microsoft.com/office/drawing/2014/main" id="{88BC7B90-4C99-4653-872A-3572A02DAE99}"/>
-              </a:ext>
-            </a:extLst>
-          </p:cNvPr>
+          <p:cNvPr id="7" name="Footer Placeholder 6"/>
           <p:cNvSpPr>
             <a:spLocks noGrp="1"/>
           </p:cNvSpPr>
@@ -2054,13 +2022,7 @@
       </p:sp>
       <p:sp>
         <p:nvSpPr>
-          <p:cNvPr id="5" name="Slide Number Placeholder 4">
-            <a:extLst>
-              <a:ext uri="{FF2B5EF4-FFF2-40B4-BE49-F238E27FC236}">
-                <a16:creationId xmlns:a16="http://schemas.microsoft.com/office/drawing/2014/main" id="{13B03516-4D31-49D2-9488-33C734A7A4F6}"/>
-              </a:ext>
-            </a:extLst>
-          </p:cNvPr>
+          <p:cNvPr id="8" name="Slide Number Placeholder 7"/>
           <p:cNvSpPr>
             <a:spLocks noGrp="1"/>
           </p:cNvSpPr>
@@ -2084,7 +2046,7 @@
     </p:spTree>
     <p:extLst>
       <p:ext uri="{BB962C8B-B14F-4D97-AF65-F5344CB8AC3E}">
-        <p14:creationId xmlns:p14="http://schemas.microsoft.com/office/powerpoint/2010/main" val="3070872991"/>
+        <p14:creationId xmlns:p14="http://schemas.microsoft.com/office/powerpoint/2010/main" val="3155704803"/>
       </p:ext>
     </p:extLst>
   </p:cSld>
@@ -2095,7 +2057,7 @@
 </file>
 
 <file path=ppt/slideLayouts/slideLayout7.xml><?xml version="1.0" encoding="utf-8"?>
-<p:sldLayout xmlns:a="http://schemas.openxmlformats.org/drawingml/2006/main" xmlns:r="http://schemas.openxmlformats.org/officeDocument/2006/relationships" xmlns:p="http://schemas.openxmlformats.org/presentationml/2006/main" type="blank" preserve="1">
+<p:sldLayout xmlns:a="http://schemas.openxmlformats.org/drawingml/2006/main" xmlns:r="http://schemas.openxmlformats.org/officeDocument/2006/relationships" xmlns:p="http://schemas.openxmlformats.org/presentationml/2006/main" showMasterSp="0" type="blank" preserve="1">
   <p:cSld name="Blank">
     <p:spTree>
       <p:nvGrpSpPr>
@@ -2113,13 +2075,7 @@
       </p:grpSpPr>
       <p:sp>
         <p:nvSpPr>
-          <p:cNvPr id="2" name="Date Placeholder 1">
-            <a:extLst>
-              <a:ext uri="{FF2B5EF4-FFF2-40B4-BE49-F238E27FC236}">
-                <a16:creationId xmlns:a16="http://schemas.microsoft.com/office/drawing/2014/main" id="{610D8488-CF25-431B-A87A-AAF141BD0BBB}"/>
-              </a:ext>
-            </a:extLst>
-          </p:cNvPr>
+          <p:cNvPr id="5" name="Date Placeholder 4"/>
           <p:cNvSpPr>
             <a:spLocks noGrp="1"/>
           </p:cNvSpPr>
@@ -2134,7 +2090,7 @@
           <a:p>
             <a:fld id="{4A75DC65-7D1F-4BAB-9695-F7E734143E14}" type="datetime1">
               <a:rPr lang="en-US" smtClean="0"/>
-              <a:t>11/30/2022</a:t>
+              <a:t>12/6/2022</a:t>
             </a:fld>
             <a:endParaRPr lang="en-US"/>
           </a:p>
@@ -2142,13 +2098,7 @@
       </p:sp>
       <p:sp>
         <p:nvSpPr>
-          <p:cNvPr id="3" name="Footer Placeholder 2">
-            <a:extLst>
-              <a:ext uri="{FF2B5EF4-FFF2-40B4-BE49-F238E27FC236}">
-                <a16:creationId xmlns:a16="http://schemas.microsoft.com/office/drawing/2014/main" id="{8A2F58E5-C92D-4C64-B867-0576B1EADD06}"/>
-              </a:ext>
-            </a:extLst>
-          </p:cNvPr>
+          <p:cNvPr id="6" name="Footer Placeholder 5"/>
           <p:cNvSpPr>
             <a:spLocks noGrp="1"/>
           </p:cNvSpPr>
@@ -2170,13 +2120,7 @@
       </p:sp>
       <p:sp>
         <p:nvSpPr>
-          <p:cNvPr id="4" name="Slide Number Placeholder 3">
-            <a:extLst>
-              <a:ext uri="{FF2B5EF4-FFF2-40B4-BE49-F238E27FC236}">
-                <a16:creationId xmlns:a16="http://schemas.microsoft.com/office/drawing/2014/main" id="{89216797-ABEC-4FE0-AFDE-36107B96710D}"/>
-              </a:ext>
-            </a:extLst>
-          </p:cNvPr>
+          <p:cNvPr id="7" name="Slide Number Placeholder 6"/>
           <p:cNvSpPr>
             <a:spLocks noGrp="1"/>
           </p:cNvSpPr>
@@ -2200,7 +2144,7 @@
     </p:spTree>
     <p:extLst>
       <p:ext uri="{BB962C8B-B14F-4D97-AF65-F5344CB8AC3E}">
-        <p14:creationId xmlns:p14="http://schemas.microsoft.com/office/powerpoint/2010/main" val="3753476834"/>
+        <p14:creationId xmlns:p14="http://schemas.microsoft.com/office/powerpoint/2010/main" val="258742098"/>
       </p:ext>
     </p:extLst>
   </p:cSld>
@@ -2229,13 +2173,7 @@
       </p:grpSpPr>
       <p:sp>
         <p:nvSpPr>
-          <p:cNvPr id="2" name="Title 1">
-            <a:extLst>
-              <a:ext uri="{FF2B5EF4-FFF2-40B4-BE49-F238E27FC236}">
-                <a16:creationId xmlns:a16="http://schemas.microsoft.com/office/drawing/2014/main" id="{FE68F2B0-990D-418E-9D10-2464E9866929}"/>
-              </a:ext>
-            </a:extLst>
-          </p:cNvPr>
+          <p:cNvPr id="2" name="Title 1"/>
           <p:cNvSpPr>
             <a:spLocks noGrp="1"/>
           </p:cNvSpPr>
@@ -2245,15 +2183,17 @@
         </p:nvSpPr>
         <p:spPr>
           <a:xfrm>
-            <a:off x="839788" y="457200"/>
-            <a:ext cx="3932237" cy="1600200"/>
+            <a:off x="256032" y="1143000"/>
+            <a:ext cx="2834640" cy="2377440"/>
           </a:xfrm>
         </p:spPr>
         <p:txBody>
-          <a:bodyPr anchor="b"/>
+          <a:bodyPr anchor="b">
+            <a:normAutofit/>
+          </a:bodyPr>
           <a:lstStyle>
             <a:lvl1pPr>
-              <a:defRPr sz="3200"/>
+              <a:defRPr sz="3200" b="0" baseline="0"/>
             </a:lvl1pPr>
           </a:lstStyle>
           <a:p>
@@ -2261,18 +2201,13 @@
               <a:rPr lang="en-US"/>
               <a:t>Click to edit Master title style</a:t>
             </a:r>
-          </a:p>
-        </p:txBody>
-      </p:sp>
-      <p:sp>
-        <p:nvSpPr>
-          <p:cNvPr id="3" name="Content Placeholder 2">
-            <a:extLst>
-              <a:ext uri="{FF2B5EF4-FFF2-40B4-BE49-F238E27FC236}">
-                <a16:creationId xmlns:a16="http://schemas.microsoft.com/office/drawing/2014/main" id="{A6881131-AFFD-4339-9F30-D408B5105CB7}"/>
-              </a:ext>
-            </a:extLst>
-          </p:cNvPr>
+            <a:endParaRPr lang="en-US" dirty="0"/>
+          </a:p>
+        </p:txBody>
+      </p:sp>
+      <p:sp>
+        <p:nvSpPr>
+          <p:cNvPr id="3" name="Content Placeholder 2"/>
           <p:cNvSpPr>
             <a:spLocks noGrp="1"/>
           </p:cNvSpPr>
@@ -2282,39 +2217,39 @@
         </p:nvSpPr>
         <p:spPr>
           <a:xfrm>
-            <a:off x="5183188" y="987425"/>
-            <a:ext cx="6172200" cy="4873625"/>
+            <a:off x="3867912" y="868680"/>
+            <a:ext cx="7315200" cy="5120640"/>
           </a:xfrm>
         </p:spPr>
         <p:txBody>
           <a:bodyPr/>
           <a:lstStyle>
             <a:lvl1pPr>
-              <a:defRPr sz="3200"/>
+              <a:defRPr sz="2000"/>
             </a:lvl1pPr>
             <a:lvl2pPr>
-              <a:defRPr sz="2800"/>
+              <a:defRPr sz="1800"/>
             </a:lvl2pPr>
             <a:lvl3pPr>
-              <a:defRPr sz="2400"/>
+              <a:defRPr sz="1600"/>
             </a:lvl3pPr>
             <a:lvl4pPr>
-              <a:defRPr sz="2000"/>
+              <a:defRPr sz="1400"/>
             </a:lvl4pPr>
             <a:lvl5pPr>
-              <a:defRPr sz="2000"/>
+              <a:defRPr sz="1400"/>
             </a:lvl5pPr>
             <a:lvl6pPr>
-              <a:defRPr sz="2000"/>
+              <a:defRPr sz="1400"/>
             </a:lvl6pPr>
             <a:lvl7pPr>
-              <a:defRPr sz="2000"/>
+              <a:defRPr sz="1400"/>
             </a:lvl7pPr>
             <a:lvl8pPr>
-              <a:defRPr sz="2000"/>
+              <a:defRPr sz="1400"/>
             </a:lvl8pPr>
             <a:lvl9pPr>
-              <a:defRPr sz="2000"/>
+              <a:defRPr sz="1400"/>
             </a:lvl9pPr>
           </a:lstStyle>
           <a:p>
@@ -2351,18 +2286,13 @@
               <a:rPr lang="en-US"/>
               <a:t>Fifth level</a:t>
             </a:r>
-          </a:p>
-        </p:txBody>
-      </p:sp>
-      <p:sp>
-        <p:nvSpPr>
-          <p:cNvPr id="4" name="Text Placeholder 3">
-            <a:extLst>
-              <a:ext uri="{FF2B5EF4-FFF2-40B4-BE49-F238E27FC236}">
-                <a16:creationId xmlns:a16="http://schemas.microsoft.com/office/drawing/2014/main" id="{7A7C47F4-7968-4698-8BD3-A583099FAA19}"/>
-              </a:ext>
-            </a:extLst>
-          </p:cNvPr>
+            <a:endParaRPr lang="en-US" dirty="0"/>
+          </a:p>
+        </p:txBody>
+      </p:sp>
+      <p:sp>
+        <p:nvSpPr>
+          <p:cNvPr id="4" name="Text Placeholder 3"/>
           <p:cNvSpPr>
             <a:spLocks noGrp="1"/>
           </p:cNvSpPr>
@@ -2372,48 +2302,57 @@
         </p:nvSpPr>
         <p:spPr>
           <a:xfrm>
-            <a:off x="839788" y="2057400"/>
-            <a:ext cx="3932237" cy="3811588"/>
+            <a:off x="256032" y="3494176"/>
+            <a:ext cx="2834640" cy="2321990"/>
           </a:xfrm>
         </p:spPr>
         <p:txBody>
-          <a:bodyPr/>
+          <a:bodyPr anchor="t">
+            <a:normAutofit/>
+          </a:bodyPr>
           <a:lstStyle>
             <a:lvl1pPr marL="0" indent="0">
-              <a:buNone/>
-              <a:defRPr sz="1600"/>
+              <a:lnSpc>
+                <a:spcPct val="100000"/>
+              </a:lnSpc>
+              <a:buNone/>
+              <a:defRPr sz="1400">
+                <a:solidFill>
+                  <a:srgbClr val="FFFFFF"/>
+                </a:solidFill>
+              </a:defRPr>
             </a:lvl1pPr>
             <a:lvl2pPr marL="457200" indent="0">
               <a:buNone/>
-              <a:defRPr sz="1400"/>
+              <a:defRPr sz="1200"/>
             </a:lvl2pPr>
             <a:lvl3pPr marL="914400" indent="0">
               <a:buNone/>
-              <a:defRPr sz="1200"/>
+              <a:defRPr sz="1000"/>
             </a:lvl3pPr>
             <a:lvl4pPr marL="1371600" indent="0">
               <a:buNone/>
-              <a:defRPr sz="1000"/>
+              <a:defRPr sz="900"/>
             </a:lvl4pPr>
             <a:lvl5pPr marL="1828800" indent="0">
               <a:buNone/>
-              <a:defRPr sz="1000"/>
+              <a:defRPr sz="900"/>
             </a:lvl5pPr>
             <a:lvl6pPr marL="2286000" indent="0">
               <a:buNone/>
-              <a:defRPr sz="1000"/>
+              <a:defRPr sz="900"/>
             </a:lvl6pPr>
             <a:lvl7pPr marL="2743200" indent="0">
               <a:buNone/>
-              <a:defRPr sz="1000"/>
+              <a:defRPr sz="900"/>
             </a:lvl7pPr>
             <a:lvl8pPr marL="3200400" indent="0">
               <a:buNone/>
-              <a:defRPr sz="1000"/>
+              <a:defRPr sz="900"/>
             </a:lvl8pPr>
             <a:lvl9pPr marL="3657600" indent="0">
               <a:buNone/>
-              <a:defRPr sz="1000"/>
+              <a:defRPr sz="900"/>
             </a:lvl9pPr>
           </a:lstStyle>
           <a:p>
@@ -2427,13 +2366,7 @@
       </p:sp>
       <p:sp>
         <p:nvSpPr>
-          <p:cNvPr id="5" name="Date Placeholder 4">
-            <a:extLst>
-              <a:ext uri="{FF2B5EF4-FFF2-40B4-BE49-F238E27FC236}">
-                <a16:creationId xmlns:a16="http://schemas.microsoft.com/office/drawing/2014/main" id="{7E12BC6F-3996-4B2B-B8F2-DD3A82CCF76B}"/>
-              </a:ext>
-            </a:extLst>
-          </p:cNvPr>
+          <p:cNvPr id="8" name="Date Placeholder 7"/>
           <p:cNvSpPr>
             <a:spLocks noGrp="1"/>
           </p:cNvSpPr>
@@ -2448,7 +2381,7 @@
           <a:p>
             <a:fld id="{7E624077-BD55-4036-8E92-6558FDF3B653}" type="datetime1">
               <a:rPr lang="en-US" smtClean="0"/>
-              <a:t>11/30/2022</a:t>
+              <a:t>12/6/2022</a:t>
             </a:fld>
             <a:endParaRPr lang="en-US"/>
           </a:p>
@@ -2456,13 +2389,7 @@
       </p:sp>
       <p:sp>
         <p:nvSpPr>
-          <p:cNvPr id="6" name="Footer Placeholder 5">
-            <a:extLst>
-              <a:ext uri="{FF2B5EF4-FFF2-40B4-BE49-F238E27FC236}">
-                <a16:creationId xmlns:a16="http://schemas.microsoft.com/office/drawing/2014/main" id="{EA832E66-581A-4CF2-A40A-4E24FAAC4AE4}"/>
-              </a:ext>
-            </a:extLst>
-          </p:cNvPr>
+          <p:cNvPr id="9" name="Footer Placeholder 8"/>
           <p:cNvSpPr>
             <a:spLocks noGrp="1"/>
           </p:cNvSpPr>
@@ -2484,13 +2411,7 @@
       </p:sp>
       <p:sp>
         <p:nvSpPr>
-          <p:cNvPr id="7" name="Slide Number Placeholder 6">
-            <a:extLst>
-              <a:ext uri="{FF2B5EF4-FFF2-40B4-BE49-F238E27FC236}">
-                <a16:creationId xmlns:a16="http://schemas.microsoft.com/office/drawing/2014/main" id="{E83B1C89-C625-4618-81A2-FB34E4DA0712}"/>
-              </a:ext>
-            </a:extLst>
-          </p:cNvPr>
+          <p:cNvPr id="10" name="Slide Number Placeholder 9"/>
           <p:cNvSpPr>
             <a:spLocks noGrp="1"/>
           </p:cNvSpPr>
@@ -2514,7 +2435,7 @@
     </p:spTree>
     <p:extLst>
       <p:ext uri="{BB962C8B-B14F-4D97-AF65-F5344CB8AC3E}">
-        <p14:creationId xmlns:p14="http://schemas.microsoft.com/office/powerpoint/2010/main" val="3207712651"/>
+        <p14:creationId xmlns:p14="http://schemas.microsoft.com/office/powerpoint/2010/main" val="3657790305"/>
       </p:ext>
     </p:extLst>
   </p:cSld>
@@ -2543,13 +2464,7 @@
       </p:grpSpPr>
       <p:sp>
         <p:nvSpPr>
-          <p:cNvPr id="2" name="Title 1">
-            <a:extLst>
-              <a:ext uri="{FF2B5EF4-FFF2-40B4-BE49-F238E27FC236}">
-                <a16:creationId xmlns:a16="http://schemas.microsoft.com/office/drawing/2014/main" id="{F551486F-443A-4F2D-AB1F-8B1F4C4DE721}"/>
-              </a:ext>
-            </a:extLst>
-          </p:cNvPr>
+          <p:cNvPr id="2" name="Title 1"/>
           <p:cNvSpPr>
             <a:spLocks noGrp="1"/>
           </p:cNvSpPr>
@@ -2559,15 +2474,17 @@
         </p:nvSpPr>
         <p:spPr>
           <a:xfrm>
-            <a:off x="839788" y="457200"/>
-            <a:ext cx="3932237" cy="1600200"/>
+            <a:off x="256032" y="1143000"/>
+            <a:ext cx="2834640" cy="2377440"/>
           </a:xfrm>
         </p:spPr>
         <p:txBody>
-          <a:bodyPr anchor="b"/>
+          <a:bodyPr anchor="b">
+            <a:normAutofit/>
+          </a:bodyPr>
           <a:lstStyle>
             <a:lvl1pPr>
-              <a:defRPr sz="3200"/>
+              <a:defRPr sz="3200" b="0"/>
             </a:lvl1pPr>
           </a:lstStyle>
           <a:p>
@@ -2575,20 +2492,15 @@
               <a:rPr lang="en-US"/>
               <a:t>Click to edit Master title style</a:t>
             </a:r>
-          </a:p>
-        </p:txBody>
-      </p:sp>
-      <p:sp>
-        <p:nvSpPr>
-          <p:cNvPr id="3" name="Picture Placeholder 2">
-            <a:extLst>
-              <a:ext uri="{FF2B5EF4-FFF2-40B4-BE49-F238E27FC236}">
-                <a16:creationId xmlns:a16="http://schemas.microsoft.com/office/drawing/2014/main" id="{E3A21213-E7FB-406A-B8CD-735AAC7AD0D9}"/>
-              </a:ext>
-            </a:extLst>
-          </p:cNvPr>
-          <p:cNvSpPr>
-            <a:spLocks noGrp="1"/>
+            <a:endParaRPr lang="en-US" dirty="0"/>
+          </a:p>
+        </p:txBody>
+      </p:sp>
+      <p:sp>
+        <p:nvSpPr>
+          <p:cNvPr id="3" name="Picture Placeholder 2"/>
+          <p:cNvSpPr>
+            <a:spLocks noGrp="1" noChangeAspect="1"/>
           </p:cNvSpPr>
           <p:nvPr>
             <p:ph type="pic" idx="1"/>
@@ -2596,12 +2508,17 @@
         </p:nvSpPr>
         <p:spPr>
           <a:xfrm>
-            <a:off x="5183188" y="987425"/>
-            <a:ext cx="6172200" cy="4873625"/>
+            <a:off x="3570644" y="767419"/>
+            <a:ext cx="8115230" cy="5330952"/>
           </a:xfrm>
+          <a:solidFill>
+            <a:schemeClr val="bg1">
+              <a:lumMod val="75000"/>
+            </a:schemeClr>
+          </a:solidFill>
         </p:spPr>
         <p:txBody>
-          <a:bodyPr/>
+          <a:bodyPr anchor="t"/>
           <a:lstStyle>
             <a:lvl1pPr marL="0" indent="0">
               <a:buNone/>
@@ -2645,18 +2562,13 @@
               <a:rPr lang="en-US"/>
               <a:t>Click icon to add picture</a:t>
             </a:r>
-          </a:p>
-        </p:txBody>
-      </p:sp>
-      <p:sp>
-        <p:nvSpPr>
-          <p:cNvPr id="4" name="Text Placeholder 3">
-            <a:extLst>
-              <a:ext uri="{FF2B5EF4-FFF2-40B4-BE49-F238E27FC236}">
-                <a16:creationId xmlns:a16="http://schemas.microsoft.com/office/drawing/2014/main" id="{F4F41A03-500E-49F7-8D99-A1EAFE4D340B}"/>
-              </a:ext>
-            </a:extLst>
-          </p:cNvPr>
+            <a:endParaRPr lang="en-US" dirty="0"/>
+          </a:p>
+        </p:txBody>
+      </p:sp>
+      <p:sp>
+        <p:nvSpPr>
+          <p:cNvPr id="4" name="Text Placeholder 3"/>
           <p:cNvSpPr>
             <a:spLocks noGrp="1"/>
           </p:cNvSpPr>
@@ -2666,48 +2578,57 @@
         </p:nvSpPr>
         <p:spPr>
           <a:xfrm>
-            <a:off x="839788" y="2057400"/>
-            <a:ext cx="3932237" cy="3811588"/>
+            <a:off x="256032" y="3493008"/>
+            <a:ext cx="2834640" cy="2322576"/>
           </a:xfrm>
         </p:spPr>
         <p:txBody>
-          <a:bodyPr/>
+          <a:bodyPr anchor="t">
+            <a:normAutofit/>
+          </a:bodyPr>
           <a:lstStyle>
             <a:lvl1pPr marL="0" indent="0">
-              <a:buNone/>
-              <a:defRPr sz="1600"/>
+              <a:lnSpc>
+                <a:spcPct val="100000"/>
+              </a:lnSpc>
+              <a:buNone/>
+              <a:defRPr sz="1400">
+                <a:solidFill>
+                  <a:srgbClr val="FFFFFF"/>
+                </a:solidFill>
+              </a:defRPr>
             </a:lvl1pPr>
             <a:lvl2pPr marL="457200" indent="0">
               <a:buNone/>
-              <a:defRPr sz="1400"/>
+              <a:defRPr sz="1200"/>
             </a:lvl2pPr>
             <a:lvl3pPr marL="914400" indent="0">
               <a:buNone/>
-              <a:defRPr sz="1200"/>
+              <a:defRPr sz="1000"/>
             </a:lvl3pPr>
             <a:lvl4pPr marL="1371600" indent="0">
               <a:buNone/>
-              <a:defRPr sz="1000"/>
+              <a:defRPr sz="900"/>
             </a:lvl4pPr>
             <a:lvl5pPr marL="1828800" indent="0">
               <a:buNone/>
-              <a:defRPr sz="1000"/>
+              <a:defRPr sz="900"/>
             </a:lvl5pPr>
             <a:lvl6pPr marL="2286000" indent="0">
               <a:buNone/>
-              <a:defRPr sz="1000"/>
+              <a:defRPr sz="900"/>
             </a:lvl6pPr>
             <a:lvl7pPr marL="2743200" indent="0">
               <a:buNone/>
-              <a:defRPr sz="1000"/>
+              <a:defRPr sz="900"/>
             </a:lvl7pPr>
             <a:lvl8pPr marL="3200400" indent="0">
               <a:buNone/>
-              <a:defRPr sz="1000"/>
+              <a:defRPr sz="900"/>
             </a:lvl8pPr>
             <a:lvl9pPr marL="3657600" indent="0">
               <a:buNone/>
-              <a:defRPr sz="1000"/>
+              <a:defRPr sz="900"/>
             </a:lvl9pPr>
           </a:lstStyle>
           <a:p>
@@ -2721,13 +2642,7 @@
       </p:sp>
       <p:sp>
         <p:nvSpPr>
-          <p:cNvPr id="5" name="Date Placeholder 4">
-            <a:extLst>
-              <a:ext uri="{FF2B5EF4-FFF2-40B4-BE49-F238E27FC236}">
-                <a16:creationId xmlns:a16="http://schemas.microsoft.com/office/drawing/2014/main" id="{5391523D-69E9-4EAE-A610-B3A237B75842}"/>
-              </a:ext>
-            </a:extLst>
-          </p:cNvPr>
+          <p:cNvPr id="8" name="Date Placeholder 7"/>
           <p:cNvSpPr>
             <a:spLocks noGrp="1"/>
           </p:cNvSpPr>
@@ -2742,7 +2657,7 @@
           <a:p>
             <a:fld id="{804225F2-7107-4609-BCC2-77C63064A5E8}" type="datetime1">
               <a:rPr lang="en-US" smtClean="0"/>
-              <a:t>11/30/2022</a:t>
+              <a:t>12/6/2022</a:t>
             </a:fld>
             <a:endParaRPr lang="en-US"/>
           </a:p>
@@ -2750,13 +2665,7 @@
       </p:sp>
       <p:sp>
         <p:nvSpPr>
-          <p:cNvPr id="6" name="Footer Placeholder 5">
-            <a:extLst>
-              <a:ext uri="{FF2B5EF4-FFF2-40B4-BE49-F238E27FC236}">
-                <a16:creationId xmlns:a16="http://schemas.microsoft.com/office/drawing/2014/main" id="{4EDB852F-4134-4AB5-BA87-483B1E1ADD21}"/>
-              </a:ext>
-            </a:extLst>
-          </p:cNvPr>
+          <p:cNvPr id="9" name="Footer Placeholder 8"/>
           <p:cNvSpPr>
             <a:spLocks noGrp="1"/>
           </p:cNvSpPr>
@@ -2764,7 +2673,12 @@
             <p:ph type="ftr" sz="quarter" idx="11"/>
           </p:nvPr>
         </p:nvSpPr>
-        <p:spPr/>
+        <p:spPr>
+          <a:xfrm>
+            <a:off x="3499101" y="6356350"/>
+            <a:ext cx="5911517" cy="365125"/>
+          </a:xfrm>
+        </p:spPr>
         <p:txBody>
           <a:bodyPr/>
           <a:lstStyle/>
@@ -2778,13 +2692,7 @@
       </p:sp>
       <p:sp>
         <p:nvSpPr>
-          <p:cNvPr id="7" name="Slide Number Placeholder 6">
-            <a:extLst>
-              <a:ext uri="{FF2B5EF4-FFF2-40B4-BE49-F238E27FC236}">
-                <a16:creationId xmlns:a16="http://schemas.microsoft.com/office/drawing/2014/main" id="{5E34C5CB-918E-4A09-8222-D36E37B63C02}"/>
-              </a:ext>
-            </a:extLst>
-          </p:cNvPr>
+          <p:cNvPr id="10" name="Slide Number Placeholder 9"/>
           <p:cNvSpPr>
             <a:spLocks noGrp="1"/>
           </p:cNvSpPr>
@@ -2808,7 +2716,7 @@
     </p:spTree>
     <p:extLst>
       <p:ext uri="{BB962C8B-B14F-4D97-AF65-F5344CB8AC3E}">
-        <p14:creationId xmlns:p14="http://schemas.microsoft.com/office/powerpoint/2010/main" val="4084137783"/>
+        <p14:creationId xmlns:p14="http://schemas.microsoft.com/office/powerpoint/2010/main" val="4085423314"/>
       </p:ext>
     </p:extLst>
   </p:cSld>
@@ -2842,31 +2750,63 @@
       </p:grpSpPr>
       <p:sp>
         <p:nvSpPr>
-          <p:cNvPr id="2" name="Title Placeholder 1">
-            <a:extLst>
-              <a:ext uri="{FF2B5EF4-FFF2-40B4-BE49-F238E27FC236}">
-                <a16:creationId xmlns:a16="http://schemas.microsoft.com/office/drawing/2014/main" id="{63AA0686-7BAC-45C0-BA30-0D0CBCE5CE63}"/>
-              </a:ext>
-            </a:extLst>
-          </p:cNvPr>
-          <p:cNvSpPr>
-            <a:spLocks noGrp="1"/>
-          </p:cNvSpPr>
-          <p:nvPr>
-            <p:ph type="title"/>
-          </p:nvPr>
+          <p:cNvPr id="7" name="Rectangle 6"/>
+          <p:cNvSpPr/>
+          <p:nvPr/>
         </p:nvSpPr>
         <p:spPr>
           <a:xfrm>
-            <a:off x="1371600" y="685800"/>
-            <a:ext cx="9486900" cy="1371600"/>
+            <a:off x="1" y="758952"/>
+            <a:ext cx="3443590" cy="5330952"/>
+          </a:xfrm>
+          <a:prstGeom prst="rect">
+            <a:avLst/>
+          </a:prstGeom>
+          <a:solidFill>
+            <a:schemeClr val="accent1"/>
+          </a:solidFill>
+          <a:ln>
+            <a:noFill/>
+          </a:ln>
+        </p:spPr>
+        <p:style>
+          <a:lnRef idx="2">
+            <a:schemeClr val="accent1">
+              <a:shade val="50000"/>
+            </a:schemeClr>
+          </a:lnRef>
+          <a:fillRef idx="1">
+            <a:schemeClr val="accent1"/>
+          </a:fillRef>
+          <a:effectRef idx="0">
+            <a:schemeClr val="accent1"/>
+          </a:effectRef>
+          <a:fontRef idx="minor">
+            <a:schemeClr val="lt1"/>
+          </a:fontRef>
+        </p:style>
+      </p:sp>
+      <p:sp>
+        <p:nvSpPr>
+          <p:cNvPr id="2" name="Title Placeholder 1"/>
+          <p:cNvSpPr>
+            <a:spLocks noGrp="1"/>
+          </p:cNvSpPr>
+          <p:nvPr>
+            <p:ph type="title"/>
+          </p:nvPr>
+        </p:nvSpPr>
+        <p:spPr>
+          <a:xfrm>
+            <a:off x="252919" y="1123837"/>
+            <a:ext cx="2947482" cy="4601183"/>
           </a:xfrm>
           <a:prstGeom prst="rect">
             <a:avLst/>
           </a:prstGeom>
         </p:spPr>
         <p:txBody>
-          <a:bodyPr vert="horz" lIns="91440" tIns="45720" rIns="91440" bIns="45720" rtlCol="0" anchor="b">
+          <a:bodyPr vert="horz" lIns="91440" tIns="45720" rIns="91440" bIns="45720" rtlCol="0" anchor="ctr">
             <a:normAutofit/>
           </a:bodyPr>
           <a:lstStyle/>
@@ -2881,31 +2821,65 @@
       </p:sp>
       <p:sp>
         <p:nvSpPr>
-          <p:cNvPr id="3" name="Text Placeholder 2">
-            <a:extLst>
-              <a:ext uri="{FF2B5EF4-FFF2-40B4-BE49-F238E27FC236}">
-                <a16:creationId xmlns:a16="http://schemas.microsoft.com/office/drawing/2014/main" id="{334202DE-82CD-407D-8C68-174B0CBB57F7}"/>
-              </a:ext>
-            </a:extLst>
-          </p:cNvPr>
-          <p:cNvSpPr>
-            <a:spLocks noGrp="1"/>
-          </p:cNvSpPr>
-          <p:nvPr>
-            <p:ph type="body" idx="1"/>
-          </p:nvPr>
+          <p:cNvPr id="38" name="Rectangle 37"/>
+          <p:cNvSpPr/>
+          <p:nvPr/>
         </p:nvSpPr>
         <p:spPr>
           <a:xfrm>
-            <a:off x="1371599" y="2254103"/>
-            <a:ext cx="9486901" cy="3918098"/>
+            <a:off x="11815864" y="758952"/>
+            <a:ext cx="384048" cy="5330952"/>
+          </a:xfrm>
+          <a:prstGeom prst="rect">
+            <a:avLst/>
+          </a:prstGeom>
+          <a:solidFill>
+            <a:srgbClr val="C8C8C8">
+              <a:alpha val="49804"/>
+            </a:srgbClr>
+          </a:solidFill>
+          <a:ln>
+            <a:noFill/>
+          </a:ln>
+        </p:spPr>
+        <p:style>
+          <a:lnRef idx="2">
+            <a:schemeClr val="accent1">
+              <a:shade val="50000"/>
+            </a:schemeClr>
+          </a:lnRef>
+          <a:fillRef idx="1">
+            <a:schemeClr val="accent1"/>
+          </a:fillRef>
+          <a:effectRef idx="0">
+            <a:schemeClr val="accent1"/>
+          </a:effectRef>
+          <a:fontRef idx="minor">
+            <a:schemeClr val="lt1"/>
+          </a:fontRef>
+        </p:style>
+      </p:sp>
+      <p:sp>
+        <p:nvSpPr>
+          <p:cNvPr id="3" name="Text Placeholder 2"/>
+          <p:cNvSpPr>
+            <a:spLocks noGrp="1"/>
+          </p:cNvSpPr>
+          <p:nvPr>
+            <p:ph type="body" idx="1"/>
+          </p:nvPr>
+        </p:nvSpPr>
+        <p:spPr>
+          <a:xfrm>
+            <a:off x="3869268" y="864108"/>
+            <a:ext cx="7315200" cy="5120640"/>
           </a:xfrm>
           <a:prstGeom prst="rect">
             <a:avLst/>
           </a:prstGeom>
         </p:spPr>
         <p:txBody>
-          <a:bodyPr vert="horz" lIns="91440" tIns="45720" rIns="91440" bIns="45720" rtlCol="0">
+          <a:bodyPr vert="horz" lIns="91440" tIns="45720" rIns="91440" bIns="45720" rtlCol="0" anchor="ctr">
             <a:normAutofit/>
           </a:bodyPr>
           <a:lstStyle/>
@@ -2949,13 +2923,7 @@
       </p:sp>
       <p:sp>
         <p:nvSpPr>
-          <p:cNvPr id="4" name="Date Placeholder 3">
-            <a:extLst>
-              <a:ext uri="{FF2B5EF4-FFF2-40B4-BE49-F238E27FC236}">
-                <a16:creationId xmlns:a16="http://schemas.microsoft.com/office/drawing/2014/main" id="{2554AC9D-6E1B-46D3-959F-A068A1EDBDBA}"/>
-              </a:ext>
-            </a:extLst>
-          </p:cNvPr>
+          <p:cNvPr id="4" name="Date Placeholder 3"/>
           <p:cNvSpPr>
             <a:spLocks noGrp="1"/>
           </p:cNvSpPr>
@@ -2964,9 +2932,9 @@
           </p:nvPr>
         </p:nvSpPr>
         <p:spPr>
-          <a:xfrm rot="5400000">
-            <a:off x="9800022" y="3223751"/>
-            <a:ext cx="4114801" cy="410501"/>
+          <a:xfrm>
+            <a:off x="262465" y="6356350"/>
+            <a:ext cx="2743200" cy="365125"/>
           </a:xfrm>
           <a:prstGeom prst="rect">
             <a:avLst/>
@@ -2975,22 +2943,21 @@
         <p:txBody>
           <a:bodyPr vert="horz" lIns="91440" tIns="45720" rIns="91440" bIns="45720" rtlCol="0" anchor="ctr"/>
           <a:lstStyle>
-            <a:lvl1pPr algn="ctr">
-              <a:defRPr sz="900" cap="all" spc="300" baseline="0">
+            <a:lvl1pPr algn="l">
+              <a:defRPr sz="1100">
                 <a:solidFill>
-                  <a:schemeClr val="tx2">
-                    <a:lumMod val="75000"/>
-                    <a:lumOff val="25000"/>
+                  <a:schemeClr val="tx1">
+                    <a:lumMod val="50000"/>
+                    <a:lumOff val="50000"/>
                   </a:schemeClr>
                 </a:solidFill>
-                <a:latin typeface="+mn-lt"/>
               </a:defRPr>
             </a:lvl1pPr>
           </a:lstStyle>
           <a:p>
             <a:fld id="{D3FE42E8-8B57-452D-A122-4DCE9AC771EF}" type="datetime1">
               <a:rPr lang="en-US" smtClean="0"/>
-              <a:t>11/30/2022</a:t>
+              <a:t>12/6/2022</a:t>
             </a:fld>
             <a:endParaRPr lang="en-US"/>
           </a:p>
@@ -2998,13 +2965,7 @@
       </p:sp>
       <p:sp>
         <p:nvSpPr>
-          <p:cNvPr id="5" name="Footer Placeholder 4">
-            <a:extLst>
-              <a:ext uri="{FF2B5EF4-FFF2-40B4-BE49-F238E27FC236}">
-                <a16:creationId xmlns:a16="http://schemas.microsoft.com/office/drawing/2014/main" id="{A5FC0015-9EFB-40F8-BC00-AC2483D60905}"/>
-              </a:ext>
-            </a:extLst>
-          </p:cNvPr>
+          <p:cNvPr id="5" name="Footer Placeholder 4"/>
           <p:cNvSpPr>
             <a:spLocks noGrp="1"/>
           </p:cNvSpPr>
@@ -3013,9 +2974,9 @@
           </p:nvPr>
         </p:nvSpPr>
         <p:spPr>
-          <a:xfrm rot="5400000">
-            <a:off x="-1708136" y="3223750"/>
-            <a:ext cx="4114800" cy="410501"/>
+          <a:xfrm>
+            <a:off x="3869268" y="6356350"/>
+            <a:ext cx="5911517" cy="365125"/>
           </a:xfrm>
           <a:prstGeom prst="rect">
             <a:avLst/>
@@ -3024,35 +2985,29 @@
         <p:txBody>
           <a:bodyPr vert="horz" lIns="91440" tIns="45720" rIns="91440" bIns="45720" rtlCol="0" anchor="ctr"/>
           <a:lstStyle>
-            <a:lvl1pPr algn="ctr">
-              <a:defRPr sz="900" cap="all" spc="300" baseline="0">
+            <a:lvl1pPr algn="l">
+              <a:defRPr sz="1100">
                 <a:solidFill>
-                  <a:schemeClr val="tx2">
-                    <a:lumMod val="75000"/>
-                    <a:lumOff val="25000"/>
+                  <a:schemeClr val="tx1">
+                    <a:lumMod val="50000"/>
+                    <a:lumOff val="50000"/>
                   </a:schemeClr>
                 </a:solidFill>
-                <a:latin typeface="+mn-lt"/>
               </a:defRPr>
             </a:lvl1pPr>
           </a:lstStyle>
           <a:p>
             <a:r>
-              <a:rPr lang="en-US" dirty="0"/>
+              <a:rPr lang="en-US"/>
               <a:t>Sample Footer Text</a:t>
             </a:r>
-          </a:p>
-        </p:txBody>
-      </p:sp>
-      <p:sp>
-        <p:nvSpPr>
-          <p:cNvPr id="6" name="Slide Number Placeholder 5">
-            <a:extLst>
-              <a:ext uri="{FF2B5EF4-FFF2-40B4-BE49-F238E27FC236}">
-                <a16:creationId xmlns:a16="http://schemas.microsoft.com/office/drawing/2014/main" id="{E572C732-0E3E-49E0-A72E-D4C08CB4455A}"/>
-              </a:ext>
-            </a:extLst>
-          </p:cNvPr>
+            <a:endParaRPr lang="en-US" dirty="0"/>
+          </a:p>
+        </p:txBody>
+      </p:sp>
+      <p:sp>
+        <p:nvSpPr>
+          <p:cNvPr id="6" name="Slide Number Placeholder 5"/>
           <p:cNvSpPr>
             <a:spLocks noGrp="1"/>
           </p:cNvSpPr>
@@ -3062,8 +3017,8 @@
         </p:nvSpPr>
         <p:spPr>
           <a:xfrm>
-            <a:off x="11116340" y="6356350"/>
-            <a:ext cx="871868" cy="365125"/>
+            <a:off x="10634135" y="6356350"/>
+            <a:ext cx="1530927" cy="365125"/>
           </a:xfrm>
           <a:prstGeom prst="rect">
             <a:avLst/>
@@ -3073,14 +3028,10 @@
           <a:bodyPr vert="horz" lIns="91440" tIns="45720" rIns="91440" bIns="45720" rtlCol="0" anchor="ctr"/>
           <a:lstStyle>
             <a:lvl1pPr algn="r">
-              <a:defRPr sz="900" spc="300">
+              <a:defRPr sz="1200" b="1">
                 <a:solidFill>
-                  <a:schemeClr val="tx2">
-                    <a:lumMod val="75000"/>
-                    <a:lumOff val="25000"/>
-                  </a:schemeClr>
+                  <a:schemeClr val="accent1"/>
                 </a:solidFill>
-                <a:latin typeface="+mn-lt"/>
               </a:defRPr>
             </a:lvl1pPr>
           </a:lstStyle>
@@ -3097,23 +3048,23 @@
     </p:spTree>
     <p:extLst>
       <p:ext uri="{BB962C8B-B14F-4D97-AF65-F5344CB8AC3E}">
-        <p14:creationId xmlns:p14="http://schemas.microsoft.com/office/powerpoint/2010/main" val="1507525800"/>
+        <p14:creationId xmlns:p14="http://schemas.microsoft.com/office/powerpoint/2010/main" val="2472752518"/>
       </p:ext>
     </p:extLst>
   </p:cSld>
   <p:clrMap bg1="lt1" tx1="dk1" bg2="lt2" tx2="dk2" accent1="accent1" accent2="accent2" accent3="accent3" accent4="accent4" accent5="accent5" accent6="accent6" hlink="hlink" folHlink="folHlink"/>
   <p:sldLayoutIdLst>
-    <p:sldLayoutId id="2147483743" r:id="rId1"/>
-    <p:sldLayoutId id="2147483744" r:id="rId2"/>
-    <p:sldLayoutId id="2147483745" r:id="rId3"/>
-    <p:sldLayoutId id="2147483746" r:id="rId4"/>
-    <p:sldLayoutId id="2147483747" r:id="rId5"/>
-    <p:sldLayoutId id="2147483741" r:id="rId6"/>
-    <p:sldLayoutId id="2147483737" r:id="rId7"/>
-    <p:sldLayoutId id="2147483738" r:id="rId8"/>
-    <p:sldLayoutId id="2147483739" r:id="rId9"/>
-    <p:sldLayoutId id="2147483740" r:id="rId10"/>
-    <p:sldLayoutId id="2147483742" r:id="rId11"/>
+    <p:sldLayoutId id="2147483780" r:id="rId1"/>
+    <p:sldLayoutId id="2147483781" r:id="rId2"/>
+    <p:sldLayoutId id="2147483782" r:id="rId3"/>
+    <p:sldLayoutId id="2147483783" r:id="rId4"/>
+    <p:sldLayoutId id="2147483784" r:id="rId5"/>
+    <p:sldLayoutId id="2147483785" r:id="rId6"/>
+    <p:sldLayoutId id="2147483786" r:id="rId7"/>
+    <p:sldLayoutId id="2147483787" r:id="rId8"/>
+    <p:sldLayoutId id="2147483788" r:id="rId9"/>
+    <p:sldLayoutId id="2147483789" r:id="rId10"/>
+    <p:sldLayoutId id="2147483790" r:id="rId11"/>
   </p:sldLayoutIdLst>
   <p:hf sldNum="0" hdr="0" ftr="0" dt="0"/>
   <p:txStyles>
@@ -3126,9 +3077,9 @@
           <a:spcPct val="0"/>
         </a:spcBef>
         <a:buNone/>
-        <a:defRPr sz="3600" kern="1200">
+        <a:defRPr sz="3600" kern="1200" spc="-60" baseline="0">
           <a:solidFill>
-            <a:schemeClr val="tx2"/>
+            <a:srgbClr val="FFFFFF"/>
           </a:solidFill>
           <a:latin typeface="+mj-lt"/>
           <a:ea typeface="+mj-ea"/>
@@ -3137,97 +3088,134 @@
       </a:lvl1pPr>
     </p:titleStyle>
     <p:bodyStyle>
-      <a:lvl1pPr marL="228600" indent="-228600" algn="l" defTabSz="914400" rtl="0" eaLnBrk="1" latinLnBrk="0" hangingPunct="1">
+      <a:lvl1pPr marL="182880" indent="-182880" algn="l" defTabSz="914400" rtl="0" eaLnBrk="1" latinLnBrk="0" hangingPunct="1">
         <a:lnSpc>
-          <a:spcPct val="100000"/>
+          <a:spcPct val="90000"/>
         </a:lnSpc>
         <a:spcBef>
-          <a:spcPts val="1000"/>
+          <a:spcPts val="1200"/>
         </a:spcBef>
-        <a:buSzPct val="70000"/>
-        <a:buFont typeface="Arial" panose="020B0604020202020204" pitchFamily="34" charset="0"/>
-        <a:buChar char="•"/>
-        <a:defRPr sz="2400" kern="1200">
+        <a:buClr>
+          <a:schemeClr val="accent1"/>
+        </a:buClr>
+        <a:buFont typeface="Wingdings 2" pitchFamily="18" charset="2"/>
+        <a:buChar char=""/>
+        <a:defRPr sz="2000" kern="1200">
           <a:solidFill>
-            <a:schemeClr val="tx2"/>
+            <a:schemeClr val="tx1">
+              <a:lumMod val="65000"/>
+              <a:lumOff val="35000"/>
+            </a:schemeClr>
           </a:solidFill>
-          <a:latin typeface="+mj-lt"/>
+          <a:latin typeface="+mn-lt"/>
           <a:ea typeface="+mn-ea"/>
           <a:cs typeface="+mn-cs"/>
         </a:defRPr>
       </a:lvl1pPr>
-      <a:lvl2pPr marL="685800" indent="-228600" algn="l" defTabSz="914400" rtl="0" eaLnBrk="1" latinLnBrk="0" hangingPunct="1">
+      <a:lvl2pPr marL="685800" indent="-182880" algn="l" defTabSz="914400" rtl="0" eaLnBrk="1" latinLnBrk="0" hangingPunct="1">
         <a:lnSpc>
-          <a:spcPct val="100000"/>
+          <a:spcPct val="90000"/>
         </a:lnSpc>
         <a:spcBef>
-          <a:spcPts val="500"/>
+          <a:spcPts val="250"/>
         </a:spcBef>
-        <a:buSzPct val="70000"/>
-        <a:buFont typeface="Arial" panose="020B0604020202020204" pitchFamily="34" charset="0"/>
-        <a:buChar char="•"/>
-        <a:defRPr sz="2000" kern="1200">
+        <a:spcAft>
+          <a:spcPts val="250"/>
+        </a:spcAft>
+        <a:buClr>
+          <a:schemeClr val="accent1"/>
+        </a:buClr>
+        <a:buFont typeface="Wingdings 2" pitchFamily="18" charset="2"/>
+        <a:buChar char=""/>
+        <a:defRPr sz="1800" kern="1200">
           <a:solidFill>
-            <a:schemeClr val="tx2"/>
+            <a:schemeClr val="tx1">
+              <a:lumMod val="65000"/>
+              <a:lumOff val="35000"/>
+            </a:schemeClr>
           </a:solidFill>
-          <a:latin typeface="+mj-lt"/>
+          <a:latin typeface="+mn-lt"/>
           <a:ea typeface="+mn-ea"/>
           <a:cs typeface="+mn-cs"/>
         </a:defRPr>
       </a:lvl2pPr>
-      <a:lvl3pPr marL="1143000" indent="-228600" algn="l" defTabSz="914400" rtl="0" eaLnBrk="1" latinLnBrk="0" hangingPunct="1">
+      <a:lvl3pPr marL="1143000" indent="-182880" algn="l" defTabSz="914400" rtl="0" eaLnBrk="1" latinLnBrk="0" hangingPunct="1">
         <a:lnSpc>
-          <a:spcPct val="100000"/>
+          <a:spcPct val="90000"/>
         </a:lnSpc>
         <a:spcBef>
-          <a:spcPts val="500"/>
+          <a:spcPts val="250"/>
         </a:spcBef>
-        <a:buSzPct val="70000"/>
-        <a:buFont typeface="Arial" panose="020B0604020202020204" pitchFamily="34" charset="0"/>
-        <a:buChar char="•"/>
-        <a:defRPr sz="1800" kern="1200">
+        <a:spcAft>
+          <a:spcPts val="250"/>
+        </a:spcAft>
+        <a:buClr>
+          <a:schemeClr val="accent1"/>
+        </a:buClr>
+        <a:buFont typeface="Wingdings 2" pitchFamily="18" charset="2"/>
+        <a:buChar char=""/>
+        <a:defRPr sz="1600" kern="1200">
           <a:solidFill>
-            <a:schemeClr val="tx2"/>
+            <a:schemeClr val="tx1">
+              <a:lumMod val="65000"/>
+              <a:lumOff val="35000"/>
+            </a:schemeClr>
           </a:solidFill>
-          <a:latin typeface="+mj-lt"/>
+          <a:latin typeface="+mn-lt"/>
           <a:ea typeface="+mn-ea"/>
           <a:cs typeface="+mn-cs"/>
         </a:defRPr>
       </a:lvl3pPr>
-      <a:lvl4pPr marL="1600200" indent="-228600" algn="l" defTabSz="914400" rtl="0" eaLnBrk="1" latinLnBrk="0" hangingPunct="1">
+      <a:lvl4pPr marL="1600200" indent="-182880" algn="l" defTabSz="914400" rtl="0" eaLnBrk="1" latinLnBrk="0" hangingPunct="1">
         <a:lnSpc>
-          <a:spcPct val="100000"/>
+          <a:spcPct val="90000"/>
         </a:lnSpc>
         <a:spcBef>
-          <a:spcPts val="500"/>
+          <a:spcPts val="250"/>
         </a:spcBef>
-        <a:buSzPct val="70000"/>
-        <a:buFont typeface="Arial" panose="020B0604020202020204" pitchFamily="34" charset="0"/>
-        <a:buChar char="•"/>
-        <a:defRPr sz="1600" kern="1200">
+        <a:spcAft>
+          <a:spcPts val="250"/>
+        </a:spcAft>
+        <a:buClr>
+          <a:schemeClr val="accent1"/>
+        </a:buClr>
+        <a:buFont typeface="Wingdings 2" pitchFamily="18" charset="2"/>
+        <a:buChar char=""/>
+        <a:defRPr sz="1400" kern="1200">
           <a:solidFill>
-            <a:schemeClr val="tx2"/>
+            <a:schemeClr val="tx1">
+              <a:lumMod val="65000"/>
+              <a:lumOff val="35000"/>
+            </a:schemeClr>
           </a:solidFill>
-          <a:latin typeface="+mj-lt"/>
+          <a:latin typeface="+mn-lt"/>
           <a:ea typeface="+mn-ea"/>
           <a:cs typeface="+mn-cs"/>
         </a:defRPr>
       </a:lvl4pPr>
-      <a:lvl5pPr marL="2057400" indent="-228600" algn="l" defTabSz="914400" rtl="0" eaLnBrk="1" latinLnBrk="0" hangingPunct="1">
+      <a:lvl5pPr marL="2057400" indent="-182880" algn="l" defTabSz="914400" rtl="0" eaLnBrk="1" latinLnBrk="0" hangingPunct="1">
         <a:lnSpc>
-          <a:spcPct val="100000"/>
+          <a:spcPct val="90000"/>
         </a:lnSpc>
         <a:spcBef>
-          <a:spcPts val="500"/>
+          <a:spcPts val="250"/>
         </a:spcBef>
-        <a:buSzPct val="70000"/>
-        <a:buFont typeface="Arial" panose="020B0604020202020204" pitchFamily="34" charset="0"/>
-        <a:buChar char="•"/>
-        <a:defRPr sz="1600" kern="1200">
+        <a:spcAft>
+          <a:spcPts val="250"/>
+        </a:spcAft>
+        <a:buClr>
+          <a:schemeClr val="accent1"/>
+        </a:buClr>
+        <a:buFont typeface="Wingdings 2" pitchFamily="18" charset="2"/>
+        <a:buChar char=""/>
+        <a:defRPr sz="1400" kern="1200">
           <a:solidFill>
-            <a:schemeClr val="tx2"/>
+            <a:schemeClr val="tx1">
+              <a:lumMod val="65000"/>
+              <a:lumOff val="35000"/>
+            </a:schemeClr>
           </a:solidFill>
-          <a:latin typeface="+mj-lt"/>
+          <a:latin typeface="+mn-lt"/>
           <a:ea typeface="+mn-ea"/>
           <a:cs typeface="+mn-cs"/>
         </a:defRPr>
@@ -3237,13 +3225,22 @@
           <a:spcPct val="90000"/>
         </a:lnSpc>
         <a:spcBef>
-          <a:spcPts val="500"/>
+          <a:spcPts val="250"/>
         </a:spcBef>
-        <a:buFont typeface="Arial" panose="020B0604020202020204" pitchFamily="34" charset="0"/>
-        <a:buChar char="•"/>
-        <a:defRPr sz="1800" kern="1200">
+        <a:spcAft>
+          <a:spcPts val="250"/>
+        </a:spcAft>
+        <a:buClr>
+          <a:schemeClr val="accent1"/>
+        </a:buClr>
+        <a:buFont typeface="Wingdings 2" pitchFamily="18" charset="2"/>
+        <a:buChar char=""/>
+        <a:defRPr sz="1400" kern="1200">
           <a:solidFill>
-            <a:schemeClr val="tx1"/>
+            <a:schemeClr val="tx1">
+              <a:lumMod val="65000"/>
+              <a:lumOff val="35000"/>
+            </a:schemeClr>
           </a:solidFill>
           <a:latin typeface="+mn-lt"/>
           <a:ea typeface="+mn-ea"/>
@@ -3255,13 +3252,22 @@
           <a:spcPct val="90000"/>
         </a:lnSpc>
         <a:spcBef>
-          <a:spcPts val="500"/>
+          <a:spcPts val="250"/>
         </a:spcBef>
-        <a:buFont typeface="Arial" panose="020B0604020202020204" pitchFamily="34" charset="0"/>
-        <a:buChar char="•"/>
-        <a:defRPr sz="1800" kern="1200">
+        <a:spcAft>
+          <a:spcPts val="250"/>
+        </a:spcAft>
+        <a:buClr>
+          <a:schemeClr val="accent1"/>
+        </a:buClr>
+        <a:buFont typeface="Wingdings 2" pitchFamily="18" charset="2"/>
+        <a:buChar char=""/>
+        <a:defRPr sz="1400" kern="1200">
           <a:solidFill>
-            <a:schemeClr val="tx1"/>
+            <a:schemeClr val="tx1">
+              <a:lumMod val="65000"/>
+              <a:lumOff val="35000"/>
+            </a:schemeClr>
           </a:solidFill>
           <a:latin typeface="+mn-lt"/>
           <a:ea typeface="+mn-ea"/>
@@ -3273,13 +3279,22 @@
           <a:spcPct val="90000"/>
         </a:lnSpc>
         <a:spcBef>
-          <a:spcPts val="500"/>
+          <a:spcPts val="250"/>
         </a:spcBef>
-        <a:buFont typeface="Arial" panose="020B0604020202020204" pitchFamily="34" charset="0"/>
-        <a:buChar char="•"/>
-        <a:defRPr sz="1800" kern="1200">
+        <a:spcAft>
+          <a:spcPts val="250"/>
+        </a:spcAft>
+        <a:buClr>
+          <a:schemeClr val="accent1"/>
+        </a:buClr>
+        <a:buFont typeface="Wingdings 2" pitchFamily="18" charset="2"/>
+        <a:buChar char=""/>
+        <a:defRPr sz="1400" kern="1200">
           <a:solidFill>
-            <a:schemeClr val="tx1"/>
+            <a:schemeClr val="tx1">
+              <a:lumMod val="65000"/>
+              <a:lumOff val="35000"/>
+            </a:schemeClr>
           </a:solidFill>
           <a:latin typeface="+mn-lt"/>
           <a:ea typeface="+mn-ea"/>
@@ -3291,13 +3306,22 @@
           <a:spcPct val="90000"/>
         </a:lnSpc>
         <a:spcBef>
-          <a:spcPts val="500"/>
+          <a:spcPts val="250"/>
         </a:spcBef>
-        <a:buFont typeface="Arial" panose="020B0604020202020204" pitchFamily="34" charset="0"/>
-        <a:buChar char="•"/>
-        <a:defRPr sz="1800" kern="1200">
+        <a:spcAft>
+          <a:spcPts val="250"/>
+        </a:spcAft>
+        <a:buClr>
+          <a:schemeClr val="accent1"/>
+        </a:buClr>
+        <a:buFont typeface="Wingdings 2" pitchFamily="18" charset="2"/>
+        <a:buChar char=""/>
+        <a:defRPr sz="1400" kern="1200">
           <a:solidFill>
-            <a:schemeClr val="tx1"/>
+            <a:schemeClr val="tx1">
+              <a:lumMod val="65000"/>
+              <a:lumOff val="35000"/>
+            </a:schemeClr>
           </a:solidFill>
           <a:latin typeface="+mn-lt"/>
           <a:ea typeface="+mn-ea"/>
@@ -3429,208 +3453,6 @@
           <a:chExt cx="0" cy="0"/>
         </a:xfrm>
       </p:grpSpPr>
-      <p:sp useBgFill="1">
-        <p:nvSpPr>
-          <p:cNvPr id="19" name="Rectangle 8">
-            <a:extLst>
-              <a:ext uri="{FF2B5EF4-FFF2-40B4-BE49-F238E27FC236}">
-                <a16:creationId xmlns:a16="http://schemas.microsoft.com/office/drawing/2014/main" id="{BFB2D26E-FBAE-45B8-B0F6-80E4ABDEC312}"/>
-              </a:ext>
-              <a:ext uri="{C183D7F6-B498-43B3-948B-1728B52AA6E4}">
-                <adec:decorative xmlns:adec="http://schemas.microsoft.com/office/drawing/2017/decorative" val="1"/>
-              </a:ext>
-            </a:extLst>
-          </p:cNvPr>
-          <p:cNvSpPr>
-            <a:spLocks noGrp="1" noRot="1" noChangeAspect="1" noMove="1" noResize="1" noEditPoints="1" noAdjustHandles="1" noChangeArrowheads="1" noChangeShapeType="1" noTextEdit="1"/>
-          </p:cNvSpPr>
-          <p:nvPr>
-            <p:extLst>
-              <p:ext uri="{386F3935-93C4-4BCD-93E2-E3B085C9AB24}">
-                <p16:designElem xmlns:p16="http://schemas.microsoft.com/office/powerpoint/2015/main" val="1"/>
-              </p:ext>
-            </p:extLst>
-          </p:nvPr>
-        </p:nvSpPr>
-        <p:spPr>
-          <a:xfrm>
-            <a:off x="0" y="0"/>
-            <a:ext cx="12192000" cy="6858000"/>
-          </a:xfrm>
-          <a:prstGeom prst="rect">
-            <a:avLst/>
-          </a:prstGeom>
-          <a:ln w="12700" cap="flat" cmpd="sng" algn="ctr">
-            <a:noFill/>
-            <a:prstDash val="solid"/>
-            <a:miter lim="800000"/>
-          </a:ln>
-          <a:effectLst/>
-          <a:extLst>
-            <a:ext uri="{91240B29-F687-4F45-9708-019B960494DF}">
-              <a14:hiddenLine xmlns:a14="http://schemas.microsoft.com/office/drawing/2010/main" w="12700" cap="flat" cmpd="sng" algn="ctr">
-                <a:solidFill>
-                  <a:schemeClr val="accent1">
-                    <a:shade val="50000"/>
-                  </a:schemeClr>
-                </a:solidFill>
-                <a:prstDash val="solid"/>
-                <a:miter lim="800000"/>
-              </a14:hiddenLine>
-            </a:ext>
-          </a:extLst>
-        </p:spPr>
-        <p:style>
-          <a:lnRef idx="2">
-            <a:schemeClr val="accent1">
-              <a:shade val="50000"/>
-            </a:schemeClr>
-          </a:lnRef>
-          <a:fillRef idx="1">
-            <a:schemeClr val="accent1"/>
-          </a:fillRef>
-          <a:effectRef idx="0">
-            <a:schemeClr val="accent1"/>
-          </a:effectRef>
-          <a:fontRef idx="minor">
-            <a:schemeClr val="lt1"/>
-          </a:fontRef>
-        </p:style>
-        <p:txBody>
-          <a:bodyPr rtlCol="0" anchor="ctr"/>
-          <a:lstStyle/>
-          <a:p>
-            <a:pPr algn="ctr"/>
-            <a:endParaRPr lang="en-US"/>
-          </a:p>
-        </p:txBody>
-      </p:sp>
-      <p:sp>
-        <p:nvSpPr>
-          <p:cNvPr id="20" name="Rectangle 10">
-            <a:extLst>
-              <a:ext uri="{FF2B5EF4-FFF2-40B4-BE49-F238E27FC236}">
-                <a16:creationId xmlns:a16="http://schemas.microsoft.com/office/drawing/2014/main" id="{23442A66-721F-4552-A3AD-3A2215F0C18B}"/>
-              </a:ext>
-              <a:ext uri="{C183D7F6-B498-43B3-948B-1728B52AA6E4}">
-                <adec:decorative xmlns:adec="http://schemas.microsoft.com/office/drawing/2017/decorative" val="1"/>
-              </a:ext>
-            </a:extLst>
-          </p:cNvPr>
-          <p:cNvSpPr>
-            <a:spLocks noGrp="1" noRot="1" noChangeAspect="1" noMove="1" noResize="1" noEditPoints="1" noAdjustHandles="1" noChangeArrowheads="1" noChangeShapeType="1" noTextEdit="1"/>
-          </p:cNvSpPr>
-          <p:nvPr>
-            <p:extLst>
-              <p:ext uri="{386F3935-93C4-4BCD-93E2-E3B085C9AB24}">
-                <p16:designElem xmlns:p16="http://schemas.microsoft.com/office/powerpoint/2015/main" val="1"/>
-              </p:ext>
-            </p:extLst>
-          </p:nvPr>
-        </p:nvSpPr>
-        <p:spPr>
-          <a:xfrm>
-            <a:off x="0" y="0"/>
-            <a:ext cx="5410200" cy="6858000"/>
-          </a:xfrm>
-          <a:prstGeom prst="rect">
-            <a:avLst/>
-          </a:prstGeom>
-          <a:solidFill>
-            <a:schemeClr val="tx2">
-              <a:lumMod val="75000"/>
-              <a:lumOff val="25000"/>
-            </a:schemeClr>
-          </a:solidFill>
-          <a:ln>
-            <a:noFill/>
-          </a:ln>
-        </p:spPr>
-        <p:style>
-          <a:lnRef idx="2">
-            <a:schemeClr val="accent1">
-              <a:shade val="50000"/>
-            </a:schemeClr>
-          </a:lnRef>
-          <a:fillRef idx="1">
-            <a:schemeClr val="accent1"/>
-          </a:fillRef>
-          <a:effectRef idx="0">
-            <a:schemeClr val="accent1"/>
-          </a:effectRef>
-          <a:fontRef idx="minor">
-            <a:schemeClr val="lt1"/>
-          </a:fontRef>
-        </p:style>
-        <p:txBody>
-          <a:bodyPr rtlCol="0" anchor="ctr"/>
-          <a:lstStyle/>
-          <a:p>
-            <a:pPr algn="ctr"/>
-            <a:endParaRPr lang="en-US"/>
-          </a:p>
-        </p:txBody>
-      </p:sp>
-      <p:sp useBgFill="1">
-        <p:nvSpPr>
-          <p:cNvPr id="21" name="Rectangle 12">
-            <a:extLst>
-              <a:ext uri="{FF2B5EF4-FFF2-40B4-BE49-F238E27FC236}">
-                <a16:creationId xmlns:a16="http://schemas.microsoft.com/office/drawing/2014/main" id="{67EA5288-5BEB-4C44-949A-ED209FE21905}"/>
-              </a:ext>
-              <a:ext uri="{C183D7F6-B498-43B3-948B-1728B52AA6E4}">
-                <adec:decorative xmlns:adec="http://schemas.microsoft.com/office/drawing/2017/decorative" val="1"/>
-              </a:ext>
-            </a:extLst>
-          </p:cNvPr>
-          <p:cNvSpPr>
-            <a:spLocks noGrp="1" noRot="1" noChangeAspect="1" noMove="1" noResize="1" noEditPoints="1" noAdjustHandles="1" noChangeArrowheads="1" noChangeShapeType="1" noTextEdit="1"/>
-          </p:cNvSpPr>
-          <p:nvPr>
-            <p:extLst>
-              <p:ext uri="{386F3935-93C4-4BCD-93E2-E3B085C9AB24}">
-                <p16:designElem xmlns:p16="http://schemas.microsoft.com/office/powerpoint/2015/main" val="1"/>
-              </p:ext>
-            </p:extLst>
-          </p:nvPr>
-        </p:nvSpPr>
-        <p:spPr>
-          <a:xfrm>
-            <a:off x="685800" y="685800"/>
-            <a:ext cx="4076700" cy="5486399"/>
-          </a:xfrm>
-          <a:prstGeom prst="rect">
-            <a:avLst/>
-          </a:prstGeom>
-          <a:ln>
-            <a:noFill/>
-          </a:ln>
-        </p:spPr>
-        <p:style>
-          <a:lnRef idx="2">
-            <a:schemeClr val="accent1">
-              <a:shade val="50000"/>
-            </a:schemeClr>
-          </a:lnRef>
-          <a:fillRef idx="1">
-            <a:schemeClr val="accent1"/>
-          </a:fillRef>
-          <a:effectRef idx="0">
-            <a:schemeClr val="accent1"/>
-          </a:effectRef>
-          <a:fontRef idx="minor">
-            <a:schemeClr val="lt1"/>
-          </a:fontRef>
-        </p:style>
-        <p:txBody>
-          <a:bodyPr rtlCol="0" anchor="ctr"/>
-          <a:lstStyle/>
-          <a:p>
-            <a:pPr algn="ctr"/>
-            <a:endParaRPr lang="en-US"/>
-          </a:p>
-        </p:txBody>
-      </p:sp>
       <p:sp>
         <p:nvSpPr>
           <p:cNvPr id="2" name="Title 1">
@@ -3691,39 +3513,10 @@
           </a:bodyPr>
           <a:lstStyle/>
           <a:p>
-            <a:endParaRPr lang="en-US" sz="2000"/>
-          </a:p>
-        </p:txBody>
-      </p:sp>
-      <p:pic>
-        <p:nvPicPr>
-          <p:cNvPr id="22" name="Picture 3" descr="Jigsaw puzzles in plastic figures">
-            <a:extLst>
-              <a:ext uri="{FF2B5EF4-FFF2-40B4-BE49-F238E27FC236}">
-                <a16:creationId xmlns:a16="http://schemas.microsoft.com/office/drawing/2014/main" id="{47C71040-E792-9012-AA83-BF3B08F16E4A}"/>
-              </a:ext>
-            </a:extLst>
-          </p:cNvPr>
-          <p:cNvPicPr>
-            <a:picLocks noChangeAspect="1"/>
-          </p:cNvPicPr>
-          <p:nvPr/>
-        </p:nvPicPr>
-        <p:blipFill rotWithShape="1">
-          <a:blip r:embed="rId2"/>
-          <a:srcRect l="17844" r="13676"/>
-          <a:stretch/>
-        </p:blipFill>
-        <p:spPr>
-          <a:xfrm>
-            <a:off x="5410200" y="10"/>
-            <a:ext cx="6781800" cy="6857990"/>
-          </a:xfrm>
-          <a:prstGeom prst="rect">
-            <a:avLst/>
-          </a:prstGeom>
-        </p:spPr>
-      </p:pic>
+            <a:endParaRPr lang="en-US" sz="2000" dirty="0"/>
+          </a:p>
+        </p:txBody>
+      </p:sp>
     </p:spTree>
     <p:extLst>
       <p:ext uri="{BB962C8B-B14F-4D97-AF65-F5344CB8AC3E}">
@@ -3803,7 +3596,16 @@
           <a:bodyPr/>
           <a:lstStyle/>
           <a:p>
-            <a:endParaRPr lang="en-US"/>
+            <a:r>
+              <a:rPr lang="en-US" dirty="0"/>
+              <a:t>Our knowledge graph is a network of 800-900 movie directors, the movies they directed, the awards they won, as well as the cast of the movies these directors worked on.</a:t>
+            </a:r>
+          </a:p>
+          <a:p>
+            <a:r>
+              <a:rPr lang="en-US" dirty="0"/>
+              <a:t>Want to see if there are opportunities to create novel working relationships between actors based on commonly-shared working directors.</a:t>
+            </a:r>
           </a:p>
         </p:txBody>
       </p:sp>
@@ -3883,7 +3685,9 @@
         </p:nvSpPr>
         <p:spPr/>
         <p:txBody>
-          <a:bodyPr/>
+          <a:bodyPr>
+            <a:normAutofit/>
+          </a:bodyPr>
           <a:lstStyle/>
           <a:p>
             <a:r>
@@ -3895,28 +3699,34 @@
             <a:pPr lvl="1"/>
             <a:r>
               <a:rPr lang="en-US" dirty="0"/>
-              <a:t>220k_awards_by_directors.csv</a:t>
+              <a:t>900_acclaimed_directors_awards.csv – A little under 900 directors and a breakdown of the count of awards they won and were nominated for. No id field. Names structured differently.</a:t>
             </a:r>
           </a:p>
           <a:p>
             <a:pPr lvl="1"/>
             <a:r>
               <a:rPr lang="en-US" dirty="0"/>
-              <a:t>AllMoviesCastingRaw.csv</a:t>
+              <a:t>AllMoviesCastingRaw.csv – The top 5 actors, the director, editor, producer, and screenplay writer, as well as their respective gender (if specified). Movie id field.</a:t>
             </a:r>
           </a:p>
           <a:p>
             <a:pPr lvl="1"/>
-            <a:endParaRPr lang="en-US" dirty="0"/>
+            <a:r>
+              <a:rPr lang="en-US" dirty="0"/>
+              <a:t>AllMoviesDetailsCleaned.csv – Details pertaining specifically to movies, including an overview. Movie id field.</a:t>
+            </a:r>
           </a:p>
           <a:p>
             <a:pPr lvl="1"/>
-            <a:endParaRPr lang="en-US" dirty="0"/>
-          </a:p>
-          <a:p>
             <a:r>
               <a:rPr lang="en-US" dirty="0"/>
-              <a:t>Processed from MovieDb.org</a:t>
+              <a:t>220k_awards_by_directors.csv – Awards won by directors. No id field.</a:t>
+            </a:r>
+          </a:p>
+          <a:p>
+            <a:r>
+              <a:rPr lang="en-US" dirty="0"/>
+              <a:t>The files were sourced from Kaggle, which in-turn were retrieved and processed data from MovieDb.org</a:t>
             </a:r>
           </a:p>
           <a:p>
@@ -3962,7 +3772,7 @@
           <p:cNvPr id="2" name="Title 1">
             <a:extLst>
               <a:ext uri="{FF2B5EF4-FFF2-40B4-BE49-F238E27FC236}">
-                <a16:creationId xmlns:a16="http://schemas.microsoft.com/office/drawing/2014/main" id="{6130A2B7-B37C-1AF7-B7C1-733BD0E9F73B}"/>
+                <a16:creationId xmlns:a16="http://schemas.microsoft.com/office/drawing/2014/main" id="{325B3E4D-A1A0-2E65-6691-8833731423DC}"/>
               </a:ext>
             </a:extLst>
           </p:cNvPr>
@@ -3980,7 +3790,7 @@
           <a:p>
             <a:r>
               <a:rPr lang="en-US" dirty="0"/>
-              <a:t>Methodology</a:t>
+              <a:t>Data Source Roles</a:t>
             </a:r>
           </a:p>
         </p:txBody>
@@ -3990,7 +3800,7 @@
           <p:cNvPr id="3" name="Content Placeholder 2">
             <a:extLst>
               <a:ext uri="{FF2B5EF4-FFF2-40B4-BE49-F238E27FC236}">
-                <a16:creationId xmlns:a16="http://schemas.microsoft.com/office/drawing/2014/main" id="{391E6E09-BF80-63DF-7B8C-2DC3253A56BE}"/>
+                <a16:creationId xmlns:a16="http://schemas.microsoft.com/office/drawing/2014/main" id="{6119F524-6735-1965-399A-EF42D09C8028}"/>
               </a:ext>
             </a:extLst>
           </p:cNvPr>
@@ -4003,27 +3813,44 @@
         </p:nvSpPr>
         <p:spPr/>
         <p:txBody>
-          <a:bodyPr/>
+          <a:bodyPr>
+            <a:normAutofit fontScale="85000" lnSpcReduction="10000"/>
+          </a:bodyPr>
           <a:lstStyle/>
           <a:p>
             <a:r>
               <a:rPr lang="en-US" dirty="0"/>
-              <a:t>Convert movie to nodes</a:t>
-            </a:r>
-          </a:p>
-          <a:p>
-            <a:endParaRPr lang="en-US" dirty="0"/>
+              <a:t>900_acclaimed_directors_awards.csv – Provides a filter of names for deciding what movies to process into our knowledge graph</a:t>
+            </a:r>
           </a:p>
           <a:p>
             <a:r>
               <a:rPr lang="en-US" dirty="0"/>
-              <a:t>AllMoviesCastingRaw.csv holds 9 roles in each tuple.</a:t>
+              <a:t>AllMoviesCastingRaw.csv – Generates nodes for actors and directors as a “Person” type, 5 actors per tuple and 1 director per tuple maximum. The person’s name and the tuple’s movie ID form the endpoints of the “Acted In” and “Directed” relationships from persons to movies.</a:t>
             </a:r>
           </a:p>
           <a:p>
             <a:r>
               <a:rPr lang="en-US" dirty="0"/>
-              <a:t>Import CSVs into neo4j using neo4j-admin</a:t>
+              <a:t>AllMoviesDetailsCleaned.csv – Each tuple directly generates a “Movie” type node. The company name information in each tuple is also used to form a maximum of 1 “Company” type node per tuple, which links from the name to the movie ID to form the “Produced” relationship. We will also train and generate several “Topic” nodes based upon the overview column across all the selected movies.</a:t>
+            </a:r>
+          </a:p>
+          <a:p>
+            <a:r>
+              <a:rPr lang="en-US" dirty="0"/>
+              <a:t>220k_awards_by_directors.csv – Forms the “Award” nodes from the unique values of award category column. Each tuple is used to form a “Won” or “Nominated” relationship from a director “Person” to the award.</a:t>
+            </a:r>
+          </a:p>
+          <a:p>
+            <a:r>
+              <a:rPr lang="en-US" dirty="0"/>
+              <a:t>The files were sourced from Kaggle, which in-turn were retrieved and processed data from MovieDb.org</a:t>
+            </a:r>
+          </a:p>
+          <a:p>
+            <a:r>
+              <a:rPr lang="en-US" dirty="0"/>
+              <a:t>https://www.kaggle.com/datasets/stephanerappeneau/350-000-movies-from-themoviedborg</a:t>
             </a:r>
           </a:p>
         </p:txBody>
@@ -4031,7 +3858,7 @@
     </p:spTree>
     <p:extLst>
       <p:ext uri="{BB962C8B-B14F-4D97-AF65-F5344CB8AC3E}">
-        <p14:creationId xmlns:p14="http://schemas.microsoft.com/office/powerpoint/2010/main" val="2783766135"/>
+        <p14:creationId xmlns:p14="http://schemas.microsoft.com/office/powerpoint/2010/main" val="4058949433"/>
       </p:ext>
     </p:extLst>
   </p:cSld>
@@ -4063,6 +3890,259 @@
           <p:cNvPr id="2" name="Title 1">
             <a:extLst>
               <a:ext uri="{FF2B5EF4-FFF2-40B4-BE49-F238E27FC236}">
+                <a16:creationId xmlns:a16="http://schemas.microsoft.com/office/drawing/2014/main" id="{6130A2B7-B37C-1AF7-B7C1-733BD0E9F73B}"/>
+              </a:ext>
+            </a:extLst>
+          </p:cNvPr>
+          <p:cNvSpPr>
+            <a:spLocks noGrp="1"/>
+          </p:cNvSpPr>
+          <p:nvPr>
+            <p:ph type="title"/>
+          </p:nvPr>
+        </p:nvSpPr>
+        <p:spPr/>
+        <p:txBody>
+          <a:bodyPr/>
+          <a:lstStyle/>
+          <a:p>
+            <a:r>
+              <a:rPr lang="en-US" dirty="0"/>
+              <a:t>Methodology Challenges</a:t>
+            </a:r>
+          </a:p>
+        </p:txBody>
+      </p:sp>
+      <p:sp>
+        <p:nvSpPr>
+          <p:cNvPr id="3" name="Content Placeholder 2">
+            <a:extLst>
+              <a:ext uri="{FF2B5EF4-FFF2-40B4-BE49-F238E27FC236}">
+                <a16:creationId xmlns:a16="http://schemas.microsoft.com/office/drawing/2014/main" id="{391E6E09-BF80-63DF-7B8C-2DC3253A56BE}"/>
+              </a:ext>
+            </a:extLst>
+          </p:cNvPr>
+          <p:cNvSpPr>
+            <a:spLocks noGrp="1"/>
+          </p:cNvSpPr>
+          <p:nvPr>
+            <p:ph idx="1"/>
+          </p:nvPr>
+        </p:nvSpPr>
+        <p:spPr/>
+        <p:txBody>
+          <a:bodyPr>
+            <a:normAutofit fontScale="92500" lnSpcReduction="20000"/>
+          </a:bodyPr>
+          <a:lstStyle/>
+          <a:p>
+            <a:r>
+              <a:rPr lang="en-US" dirty="0"/>
+              <a:t>350,000 movies is a lot to process, on top of their respective cast, the 220,000 awards, and linking it all together.</a:t>
+            </a:r>
+          </a:p>
+          <a:p>
+            <a:r>
+              <a:rPr lang="en-US" dirty="0"/>
+              <a:t>To expedite the process, we filtered the movies down to those whose director is in the 900 acclaimed actors file.</a:t>
+            </a:r>
+          </a:p>
+          <a:p>
+            <a:pPr lvl="1"/>
+            <a:r>
+              <a:rPr lang="en-US" dirty="0"/>
+              <a:t>Limitations to this process is that it omits directors who served exclusively in other casting roles within our data set.</a:t>
+            </a:r>
+          </a:p>
+          <a:p>
+            <a:pPr lvl="1"/>
+            <a:r>
+              <a:rPr lang="en-US" dirty="0"/>
+              <a:t>In addition, it’s been determined that the acclaimed directors’ names have a minority of cases where name ordering, capitalization, and accenting differ from the rest of the data sets (i.e. Jane Van Doe vs . </a:t>
+            </a:r>
+            <a:r>
+              <a:rPr lang="en-US" dirty="0" err="1"/>
+              <a:t>Döe</a:t>
+            </a:r>
+            <a:r>
+              <a:rPr lang="en-US" dirty="0"/>
+              <a:t> Jane van).</a:t>
+            </a:r>
+          </a:p>
+          <a:p>
+            <a:r>
+              <a:rPr lang="en-US" dirty="0"/>
+              <a:t>The way the company, company, topic, and awards information are organized disallow for a direct import into Neo4j.</a:t>
+            </a:r>
+          </a:p>
+          <a:p>
+            <a:pPr lvl="1"/>
+            <a:r>
+              <a:rPr lang="en-US" dirty="0"/>
+              <a:t>Cast – The information for 6 nodes are stacked together for each tuple in the cast data set.</a:t>
+            </a:r>
+          </a:p>
+          <a:p>
+            <a:pPr lvl="1"/>
+            <a:r>
+              <a:rPr lang="en-US" dirty="0"/>
+              <a:t>Company – In the movie data set, company names can repeat between movies, and so we can’t just make a new node for every tuple for companies. It must be extracted from the movies data set.</a:t>
+            </a:r>
+          </a:p>
+          <a:p>
+            <a:pPr lvl="1"/>
+            <a:r>
+              <a:rPr lang="en-US" dirty="0"/>
+              <a:t>Topics – They do not exist as an attribute in any of the data sets. They must be generated and then mapped to the most fitting films.</a:t>
+            </a:r>
+          </a:p>
+          <a:p>
+            <a:pPr lvl="1"/>
+            <a:r>
+              <a:rPr lang="en-US" dirty="0"/>
+              <a:t>Awards – An award may be won or nominated multiple times by a director. We can’t use the tuples directly and must compress all the years into a single relationship for each category.</a:t>
+            </a:r>
+          </a:p>
+        </p:txBody>
+      </p:sp>
+    </p:spTree>
+    <p:extLst>
+      <p:ext uri="{BB962C8B-B14F-4D97-AF65-F5344CB8AC3E}">
+        <p14:creationId xmlns:p14="http://schemas.microsoft.com/office/powerpoint/2010/main" val="2783766135"/>
+      </p:ext>
+    </p:extLst>
+  </p:cSld>
+  <p:clrMapOvr>
+    <a:masterClrMapping/>
+  </p:clrMapOvr>
+</p:sld>
+</file>
+
+<file path=ppt/slides/slide6.xml><?xml version="1.0" encoding="utf-8"?>
+<p:sld xmlns:a="http://schemas.openxmlformats.org/drawingml/2006/main" xmlns:r="http://schemas.openxmlformats.org/officeDocument/2006/relationships" xmlns:p="http://schemas.openxmlformats.org/presentationml/2006/main">
+  <p:cSld>
+    <p:spTree>
+      <p:nvGrpSpPr>
+        <p:cNvPr id="1" name=""/>
+        <p:cNvGrpSpPr/>
+        <p:nvPr/>
+      </p:nvGrpSpPr>
+      <p:grpSpPr>
+        <a:xfrm>
+          <a:off x="0" y="0"/>
+          <a:ext cx="0" cy="0"/>
+          <a:chOff x="0" y="0"/>
+          <a:chExt cx="0" cy="0"/>
+        </a:xfrm>
+      </p:grpSpPr>
+      <p:sp>
+        <p:nvSpPr>
+          <p:cNvPr id="2" name="Title 1">
+            <a:extLst>
+              <a:ext uri="{FF2B5EF4-FFF2-40B4-BE49-F238E27FC236}">
+                <a16:creationId xmlns:a16="http://schemas.microsoft.com/office/drawing/2014/main" id="{4E5CC5D9-E412-11AA-2AF6-32F2D8EA7CAE}"/>
+              </a:ext>
+            </a:extLst>
+          </p:cNvPr>
+          <p:cNvSpPr>
+            <a:spLocks noGrp="1"/>
+          </p:cNvSpPr>
+          <p:nvPr>
+            <p:ph type="title"/>
+          </p:nvPr>
+        </p:nvSpPr>
+        <p:spPr/>
+        <p:txBody>
+          <a:bodyPr/>
+          <a:lstStyle/>
+          <a:p>
+            <a:r>
+              <a:rPr lang="en-US" dirty="0"/>
+              <a:t>Preprocessing</a:t>
+            </a:r>
+          </a:p>
+        </p:txBody>
+      </p:sp>
+      <p:sp>
+        <p:nvSpPr>
+          <p:cNvPr id="3" name="Content Placeholder 2">
+            <a:extLst>
+              <a:ext uri="{FF2B5EF4-FFF2-40B4-BE49-F238E27FC236}">
+                <a16:creationId xmlns:a16="http://schemas.microsoft.com/office/drawing/2014/main" id="{C8D23BE8-3539-86EF-2875-6E4CB2B5ECD3}"/>
+              </a:ext>
+            </a:extLst>
+          </p:cNvPr>
+          <p:cNvSpPr>
+            <a:spLocks noGrp="1"/>
+          </p:cNvSpPr>
+          <p:nvPr>
+            <p:ph idx="1"/>
+          </p:nvPr>
+        </p:nvSpPr>
+        <p:spPr/>
+        <p:txBody>
+          <a:bodyPr/>
+          <a:lstStyle/>
+          <a:p>
+            <a:r>
+              <a:rPr lang="en-US" dirty="0"/>
+              <a:t>The names of people in all tables were standardized to a </a:t>
+            </a:r>
+          </a:p>
+          <a:p>
+            <a:r>
+              <a:rPr lang="en-US" dirty="0"/>
+              <a:t>For the 900 acclaimed directors, a </a:t>
+            </a:r>
+            <a:r>
+              <a:rPr lang="en-US" dirty="0" err="1"/>
+              <a:t>jaccard</a:t>
+            </a:r>
+            <a:r>
+              <a:rPr lang="en-US" dirty="0"/>
+              <a:t> similarity score was used to determine if the directors in the cast dataset were approximately equal to any inside the smaller data set. Those movies with directors that met the criteria were then selected. The same was then applied to the awards data set.</a:t>
+            </a:r>
+          </a:p>
+          <a:p>
+            <a:endParaRPr lang="en-US" dirty="0"/>
+          </a:p>
+        </p:txBody>
+      </p:sp>
+    </p:spTree>
+    <p:extLst>
+      <p:ext uri="{BB962C8B-B14F-4D97-AF65-F5344CB8AC3E}">
+        <p14:creationId xmlns:p14="http://schemas.microsoft.com/office/powerpoint/2010/main" val="2057450764"/>
+      </p:ext>
+    </p:extLst>
+  </p:cSld>
+  <p:clrMapOvr>
+    <a:masterClrMapping/>
+  </p:clrMapOvr>
+</p:sld>
+</file>
+
+<file path=ppt/slides/slide7.xml><?xml version="1.0" encoding="utf-8"?>
+<p:sld xmlns:a="http://schemas.openxmlformats.org/drawingml/2006/main" xmlns:r="http://schemas.openxmlformats.org/officeDocument/2006/relationships" xmlns:p="http://schemas.openxmlformats.org/presentationml/2006/main">
+  <p:cSld>
+    <p:spTree>
+      <p:nvGrpSpPr>
+        <p:cNvPr id="1" name=""/>
+        <p:cNvGrpSpPr/>
+        <p:nvPr/>
+      </p:nvGrpSpPr>
+      <p:grpSpPr>
+        <a:xfrm>
+          <a:off x="0" y="0"/>
+          <a:ext cx="0" cy="0"/>
+          <a:chOff x="0" y="0"/>
+          <a:chExt cx="0" cy="0"/>
+        </a:xfrm>
+      </p:grpSpPr>
+      <p:sp>
+        <p:nvSpPr>
+          <p:cNvPr id="2" name="Title 1">
+            <a:extLst>
+              <a:ext uri="{FF2B5EF4-FFF2-40B4-BE49-F238E27FC236}">
                 <a16:creationId xmlns:a16="http://schemas.microsoft.com/office/drawing/2014/main" id="{F08C011C-2732-616F-CB84-14F746F09807}"/>
               </a:ext>
             </a:extLst>
@@ -4108,10 +4188,63 @@
         </p:nvSpPr>
         <p:spPr/>
         <p:txBody>
-          <a:bodyPr/>
-          <a:lstStyle/>
-          <a:p>
-            <a:endParaRPr lang="en-US"/>
+          <a:bodyPr>
+            <a:normAutofit lnSpcReduction="10000"/>
+          </a:bodyPr>
+          <a:lstStyle/>
+          <a:p>
+            <a:r>
+              <a:rPr lang="en-US" dirty="0"/>
+              <a:t>Which directors have the most of awards in a genre ?</a:t>
+            </a:r>
+          </a:p>
+          <a:p>
+            <a:r>
+              <a:rPr lang="en-US" dirty="0"/>
+              <a:t>Find actors who worked with the same director but not in the same movie ?</a:t>
+            </a:r>
+          </a:p>
+          <a:p>
+            <a:r>
+              <a:rPr lang="en-US" dirty="0"/>
+              <a:t>Find actors who won awards with the same director in the same movie genre ?</a:t>
+            </a:r>
+          </a:p>
+          <a:p>
+            <a:r>
+              <a:rPr lang="en-US" dirty="0"/>
+              <a:t>Which actors should work together in a movie ?</a:t>
+            </a:r>
+          </a:p>
+          <a:p>
+            <a:r>
+              <a:rPr lang="en-US" dirty="0"/>
+              <a:t>We could start by finding actors that never worked together but have worked with multiple actors in common. So IF actor A and B have worked with actor C and director X and have won awards with director X in genre Y.</a:t>
+            </a:r>
+          </a:p>
+          <a:p>
+            <a:r>
+              <a:rPr lang="en-US" dirty="0"/>
+              <a:t>A and B have never worked in a movie together.</a:t>
+            </a:r>
+          </a:p>
+          <a:p>
+            <a:r>
+              <a:rPr lang="en-US" dirty="0"/>
+              <a:t>Actors must speak at least one common language (determined by original language of movies worked in)</a:t>
+            </a:r>
+          </a:p>
+          <a:p>
+            <a:r>
+              <a:rPr lang="en-US" dirty="0"/>
+              <a:t>Give the top 10 actors by # of finds for that specific actor.</a:t>
+            </a:r>
+          </a:p>
+          <a:p>
+            <a:r>
+              <a:rPr lang="en-US" dirty="0"/>
+              <a:t>Which actors work ONLY with directors who won 1 award or less.</a:t>
+            </a:r>
           </a:p>
         </p:txBody>
       </p:sp>
@@ -4129,9 +4262,9 @@
 </file>
 
 <file path=ppt/theme/theme1.xml><?xml version="1.0" encoding="utf-8"?>
-<a:theme xmlns:a="http://schemas.openxmlformats.org/drawingml/2006/main" name="ClassicFrameVTI">
+<a:theme xmlns:a="http://schemas.openxmlformats.org/drawingml/2006/main" name="Frame">
   <a:themeElements>
-    <a:clrScheme name="AnalogousFromLightSeedLeftStep">
+    <a:clrScheme name="Frame">
       <a:dk1>
         <a:srgbClr val="000000"/>
       </a:dk1>
@@ -4139,127 +4272,147 @@
         <a:srgbClr val="FFFFFF"/>
       </a:lt1>
       <a:dk2>
-        <a:srgbClr val="1B2F2C"/>
+        <a:srgbClr val="545454"/>
       </a:dk2>
       <a:lt2>
-        <a:srgbClr val="F0F0F3"/>
+        <a:srgbClr val="BFBFBF"/>
       </a:lt2>
       <a:accent1>
-        <a:srgbClr val="A7A259"/>
+        <a:srgbClr val="40BAD2"/>
       </a:accent1>
       <a:accent2>
-        <a:srgbClr val="D99147"/>
+        <a:srgbClr val="FAB900"/>
       </a:accent2>
       <a:accent3>
-        <a:srgbClr val="E38379"/>
+        <a:srgbClr val="90BB23"/>
       </a:accent3>
       <a:accent4>
-        <a:srgbClr val="DD5C85"/>
+        <a:srgbClr val="EE7008"/>
       </a:accent4>
       <a:accent5>
-        <a:srgbClr val="E379C8"/>
+        <a:srgbClr val="1AB39F"/>
       </a:accent5>
       <a:accent6>
-        <a:srgbClr val="C95CDD"/>
+        <a:srgbClr val="D5393D"/>
       </a:accent6>
       <a:hlink>
-        <a:srgbClr val="6C71B0"/>
+        <a:srgbClr val="90BB23"/>
       </a:hlink>
       <a:folHlink>
-        <a:srgbClr val="7F7F7F"/>
+        <a:srgbClr val="EE7008"/>
       </a:folHlink>
     </a:clrScheme>
-    <a:fontScheme name="Goudy and Gill Sans">
+    <a:fontScheme name="Frame">
       <a:majorFont>
-        <a:latin typeface="Goudy Old Style"/>
+        <a:latin typeface="Corbel" panose="020B0503020204020204"/>
         <a:ea typeface=""/>
         <a:cs typeface=""/>
+        <a:font script="Jpan" typeface="ＭＳ ゴシック"/>
+        <a:font script="Hang" typeface="HY중고딕"/>
+        <a:font script="Hans" typeface="幼圆"/>
+        <a:font script="Hant" typeface="微軟正黑體"/>
+        <a:font script="Arab" typeface="Tahoma"/>
+        <a:font script="Hebr" typeface="Gisha"/>
+        <a:font script="Thai" typeface="DilleniaUPC"/>
+        <a:font script="Ethi" typeface="Nyala"/>
+        <a:font script="Beng" typeface="Vrinda"/>
+        <a:font script="Gujr" typeface="Shruti"/>
+        <a:font script="Khmr" typeface="DaunPenh"/>
+        <a:font script="Knda" typeface="Tunga"/>
+        <a:font script="Guru" typeface="Raavi"/>
+        <a:font script="Cans" typeface="Euphemia"/>
+        <a:font script="Cher" typeface="Plantagenet Cherokee"/>
+        <a:font script="Yiii" typeface="Microsoft Yi Baiti"/>
+        <a:font script="Tibt" typeface="Microsoft Himalaya"/>
+        <a:font script="Thaa" typeface="MV Boli"/>
+        <a:font script="Deva" typeface="Mangal"/>
+        <a:font script="Telu" typeface="Gautami"/>
+        <a:font script="Taml" typeface="Latha"/>
+        <a:font script="Syrc" typeface="Estrangelo Edessa"/>
+        <a:font script="Orya" typeface="Kalinga"/>
+        <a:font script="Mlym" typeface="Kartika"/>
+        <a:font script="Laoo" typeface="DokChampa"/>
+        <a:font script="Sinh" typeface="Iskoola Pota"/>
+        <a:font script="Mong" typeface="Mongolian Baiti"/>
+        <a:font script="Viet" typeface="Tahoma"/>
+        <a:font script="Uigh" typeface="Microsoft Uighur"/>
+        <a:font script="Geor" typeface="Sylfaen"/>
       </a:majorFont>
       <a:minorFont>
-        <a:latin typeface="Gill Sans MT"/>
+        <a:latin typeface="Corbel" panose="020B0503020204020204"/>
         <a:ea typeface=""/>
         <a:cs typeface=""/>
+        <a:font script="Jpan" typeface="ＭＳ ゴシック"/>
+        <a:font script="Hang" typeface="HY중고딕"/>
+        <a:font script="Hans" typeface="幼圆"/>
+        <a:font script="Hant" typeface="微軟正黑體"/>
+        <a:font script="Arab" typeface="Tahoma"/>
+        <a:font script="Hebr" typeface="Gisha"/>
+        <a:font script="Thai" typeface="DilleniaUPC"/>
+        <a:font script="Ethi" typeface="Nyala"/>
+        <a:font script="Beng" typeface="Vrinda"/>
+        <a:font script="Gujr" typeface="Shruti"/>
+        <a:font script="Khmr" typeface="DaunPenh"/>
+        <a:font script="Knda" typeface="Tunga"/>
+        <a:font script="Guru" typeface="Raavi"/>
+        <a:font script="Cans" typeface="Euphemia"/>
+        <a:font script="Cher" typeface="Plantagenet Cherokee"/>
+        <a:font script="Yiii" typeface="Microsoft Yi Baiti"/>
+        <a:font script="Tibt" typeface="Microsoft Himalaya"/>
+        <a:font script="Thaa" typeface="MV Boli"/>
+        <a:font script="Deva" typeface="Mangal"/>
+        <a:font script="Telu" typeface="Gautami"/>
+        <a:font script="Taml" typeface="Latha"/>
+        <a:font script="Syrc" typeface="Estrangelo Edessa"/>
+        <a:font script="Orya" typeface="Kalinga"/>
+        <a:font script="Mlym" typeface="Kartika"/>
+        <a:font script="Laoo" typeface="DokChampa"/>
+        <a:font script="Sinh" typeface="Iskoola Pota"/>
+        <a:font script="Mong" typeface="Mongolian Baiti"/>
+        <a:font script="Viet" typeface="Verdana"/>
+        <a:font script="Uigh" typeface="Microsoft Uighur"/>
+        <a:font script="Geor" typeface="Sylfaen"/>
       </a:minorFont>
     </a:fontScheme>
-    <a:fmtScheme name="Office">
+    <a:fmtScheme name="Frame">
       <a:fillStyleLst>
         <a:solidFill>
           <a:schemeClr val="phClr"/>
         </a:solidFill>
-        <a:gradFill rotWithShape="1">
-          <a:gsLst>
-            <a:gs pos="0">
-              <a:schemeClr val="phClr">
-                <a:lumMod val="110000"/>
-                <a:satMod val="105000"/>
-                <a:tint val="67000"/>
-              </a:schemeClr>
-            </a:gs>
-            <a:gs pos="50000">
-              <a:schemeClr val="phClr">
-                <a:lumMod val="105000"/>
-                <a:satMod val="103000"/>
-                <a:tint val="73000"/>
-              </a:schemeClr>
-            </a:gs>
-            <a:gs pos="100000">
-              <a:schemeClr val="phClr">
-                <a:lumMod val="105000"/>
-                <a:satMod val="109000"/>
-                <a:tint val="81000"/>
-              </a:schemeClr>
-            </a:gs>
-          </a:gsLst>
-          <a:lin ang="5400000" scaled="0"/>
-        </a:gradFill>
-        <a:gradFill rotWithShape="1">
-          <a:gsLst>
-            <a:gs pos="0">
-              <a:schemeClr val="phClr">
-                <a:satMod val="103000"/>
-                <a:lumMod val="102000"/>
-                <a:tint val="94000"/>
-              </a:schemeClr>
-            </a:gs>
-            <a:gs pos="50000">
-              <a:schemeClr val="phClr">
-                <a:satMod val="110000"/>
-                <a:lumMod val="100000"/>
-                <a:shade val="100000"/>
-              </a:schemeClr>
-            </a:gs>
-            <a:gs pos="100000">
-              <a:schemeClr val="phClr">
-                <a:lumMod val="99000"/>
-                <a:satMod val="120000"/>
-                <a:shade val="78000"/>
-              </a:schemeClr>
-            </a:gs>
-          </a:gsLst>
-          <a:lin ang="5400000" scaled="0"/>
-        </a:gradFill>
+        <a:solidFill>
+          <a:schemeClr val="phClr">
+            <a:tint val="65000"/>
+          </a:schemeClr>
+        </a:solidFill>
+        <a:solidFill>
+          <a:schemeClr val="phClr">
+            <a:shade val="80000"/>
+            <a:satMod val="150000"/>
+          </a:schemeClr>
+        </a:solidFill>
       </a:fillStyleLst>
       <a:lnStyleLst>
-        <a:ln w="6350" cap="flat" cmpd="sng" algn="ctr">
+        <a:ln w="9525" cap="flat" cmpd="sng" algn="ctr">
           <a:solidFill>
             <a:schemeClr val="phClr"/>
           </a:solidFill>
           <a:prstDash val="solid"/>
-          <a:miter lim="800000"/>
         </a:ln>
-        <a:ln w="12700" cap="flat" cmpd="sng" algn="ctr">
+        <a:ln w="10795" cap="flat" cmpd="sng" algn="ctr">
           <a:solidFill>
             <a:schemeClr val="phClr"/>
           </a:solidFill>
           <a:prstDash val="solid"/>
-          <a:miter lim="800000"/>
         </a:ln>
-        <a:ln w="19050" cap="flat" cmpd="sng" algn="ctr">
+        <a:ln w="17145" cap="flat" cmpd="sng" algn="ctr">
           <a:solidFill>
-            <a:schemeClr val="phClr"/>
+            <a:schemeClr val="phClr">
+              <a:shade val="95000"/>
+              <a:alpha val="50000"/>
+              <a:satMod val="150000"/>
+            </a:schemeClr>
           </a:solidFill>
           <a:prstDash val="solid"/>
-          <a:miter lim="800000"/>
         </a:ln>
       </a:lnStyleLst>
       <a:effectStyleLst>
@@ -4271,12 +4424,21 @@
         </a:effectStyle>
         <a:effectStyle>
           <a:effectLst>
-            <a:outerShdw blurRad="57150" dist="19050" dir="5400000" algn="ctr" rotWithShape="0">
+            <a:outerShdw blurRad="44450" dist="13970" dir="5400000" algn="ctr" rotWithShape="0">
               <a:srgbClr val="000000">
-                <a:alpha val="63000"/>
+                <a:alpha val="45000"/>
               </a:srgbClr>
             </a:outerShdw>
           </a:effectLst>
+          <a:scene3d>
+            <a:camera prst="orthographicFront">
+              <a:rot lat="0" lon="0" rev="0"/>
+            </a:camera>
+            <a:lightRig rig="twoPt" dir="tl"/>
+          </a:scene3d>
+          <a:sp3d prstMaterial="flat">
+            <a:bevelT w="12700" h="25400" prst="coolSlant"/>
+          </a:sp3d>
         </a:effectStyle>
       </a:effectStyleLst>
       <a:bgFillStyleLst>
@@ -4294,23 +4456,24 @@
             <a:gs pos="0">
               <a:schemeClr val="phClr">
                 <a:tint val="93000"/>
-                <a:satMod val="150000"/>
                 <a:shade val="98000"/>
+                <a:satMod val="120000"/>
                 <a:lumMod val="102000"/>
               </a:schemeClr>
             </a:gs>
-            <a:gs pos="50000">
+            <a:gs pos="48000">
               <a:schemeClr val="phClr">
                 <a:tint val="98000"/>
-                <a:satMod val="130000"/>
                 <a:shade val="90000"/>
+                <a:satMod val="110000"/>
                 <a:lumMod val="103000"/>
               </a:schemeClr>
             </a:gs>
             <a:gs pos="100000">
               <a:schemeClr val="phClr">
-                <a:shade val="63000"/>
-                <a:satMod val="120000"/>
+                <a:tint val="98000"/>
+                <a:shade val="80000"/>
+                <a:satMod val="100000"/>
               </a:schemeClr>
             </a:gs>
           </a:gsLst>
@@ -4323,7 +4486,7 @@
   <a:extraClrSchemeLst/>
   <a:extLst>
     <a:ext uri="{05A4C25C-085E-4340-85A3-A5531E510DB2}">
-      <thm15:themeFamily xmlns:thm15="http://schemas.microsoft.com/office/thememl/2012/main" name="ClassicFrameVTI" id="{4FA2A165-EC65-4FB0-B019-8C8876A1D8E3}" vid="{9D78F1F1-8226-42FD-A1A3-975EDF6D60F8}"/>
+      <thm15:themeFamily xmlns:thm15="http://schemas.microsoft.com/office/thememl/2012/main" name="Frame" id="{F226E7A2-7162-461C-9490-D27D9DC04E43}" vid="{629A0216-3BBD-45C0-B63F-2683BEA18F60}"/>
     </a:ext>
   </a:extLst>
 </a:theme>

</xml_diff>